<commit_message>
Worked further on the processor design section.
</commit_message>
<xml_diff>
--- a/material/figures/2-qubit-processor/processor photos.pptx
+++ b/material/figures/2-qubit-processor/processor photos.pptx
@@ -6,6 +6,7 @@
   </p:sldMasterIdLst>
   <p:sldIdLst>
     <p:sldId id="256" r:id="rId2"/>
+    <p:sldId id="257" r:id="rId3"/>
   </p:sldIdLst>
   <p:sldSz cx="9144000" cy="6858000" type="screen4x3"/>
   <p:notesSz cx="6858000" cy="9144000"/>
@@ -289,7 +290,7 @@
             <a:fld id="{7CBDB685-D201-4371-8936-3DCA4D4F9BC3}" type="datetimeFigureOut">
               <a:rPr lang="de-DE" smtClean="0"/>
               <a:pPr/>
-              <a:t>26.05.2012</a:t>
+              <a:t>02.08.2012</a:t>
             </a:fld>
             <a:endParaRPr lang="de-DE"/>
           </a:p>
@@ -456,7 +457,7 @@
             <a:fld id="{7CBDB685-D201-4371-8936-3DCA4D4F9BC3}" type="datetimeFigureOut">
               <a:rPr lang="de-DE" smtClean="0"/>
               <a:pPr/>
-              <a:t>26.05.2012</a:t>
+              <a:t>02.08.2012</a:t>
             </a:fld>
             <a:endParaRPr lang="de-DE"/>
           </a:p>
@@ -633,7 +634,7 @@
             <a:fld id="{7CBDB685-D201-4371-8936-3DCA4D4F9BC3}" type="datetimeFigureOut">
               <a:rPr lang="de-DE" smtClean="0"/>
               <a:pPr/>
-              <a:t>26.05.2012</a:t>
+              <a:t>02.08.2012</a:t>
             </a:fld>
             <a:endParaRPr lang="de-DE"/>
           </a:p>
@@ -800,7 +801,7 @@
             <a:fld id="{7CBDB685-D201-4371-8936-3DCA4D4F9BC3}" type="datetimeFigureOut">
               <a:rPr lang="de-DE" smtClean="0"/>
               <a:pPr/>
-              <a:t>26.05.2012</a:t>
+              <a:t>02.08.2012</a:t>
             </a:fld>
             <a:endParaRPr lang="de-DE"/>
           </a:p>
@@ -1043,7 +1044,7 @@
             <a:fld id="{7CBDB685-D201-4371-8936-3DCA4D4F9BC3}" type="datetimeFigureOut">
               <a:rPr lang="de-DE" smtClean="0"/>
               <a:pPr/>
-              <a:t>26.05.2012</a:t>
+              <a:t>02.08.2012</a:t>
             </a:fld>
             <a:endParaRPr lang="de-DE"/>
           </a:p>
@@ -1328,7 +1329,7 @@
             <a:fld id="{7CBDB685-D201-4371-8936-3DCA4D4F9BC3}" type="datetimeFigureOut">
               <a:rPr lang="de-DE" smtClean="0"/>
               <a:pPr/>
-              <a:t>26.05.2012</a:t>
+              <a:t>02.08.2012</a:t>
             </a:fld>
             <a:endParaRPr lang="de-DE"/>
           </a:p>
@@ -1747,7 +1748,7 @@
             <a:fld id="{7CBDB685-D201-4371-8936-3DCA4D4F9BC3}" type="datetimeFigureOut">
               <a:rPr lang="de-DE" smtClean="0"/>
               <a:pPr/>
-              <a:t>26.05.2012</a:t>
+              <a:t>02.08.2012</a:t>
             </a:fld>
             <a:endParaRPr lang="de-DE"/>
           </a:p>
@@ -1862,7 +1863,7 @@
             <a:fld id="{7CBDB685-D201-4371-8936-3DCA4D4F9BC3}" type="datetimeFigureOut">
               <a:rPr lang="de-DE" smtClean="0"/>
               <a:pPr/>
-              <a:t>26.05.2012</a:t>
+              <a:t>02.08.2012</a:t>
             </a:fld>
             <a:endParaRPr lang="de-DE"/>
           </a:p>
@@ -1954,7 +1955,7 @@
             <a:fld id="{7CBDB685-D201-4371-8936-3DCA4D4F9BC3}" type="datetimeFigureOut">
               <a:rPr lang="de-DE" smtClean="0"/>
               <a:pPr/>
-              <a:t>26.05.2012</a:t>
+              <a:t>02.08.2012</a:t>
             </a:fld>
             <a:endParaRPr lang="de-DE"/>
           </a:p>
@@ -2228,7 +2229,7 @@
             <a:fld id="{7CBDB685-D201-4371-8936-3DCA4D4F9BC3}" type="datetimeFigureOut">
               <a:rPr lang="de-DE" smtClean="0"/>
               <a:pPr/>
-              <a:t>26.05.2012</a:t>
+              <a:t>02.08.2012</a:t>
             </a:fld>
             <a:endParaRPr lang="de-DE"/>
           </a:p>
@@ -2478,7 +2479,7 @@
             <a:fld id="{7CBDB685-D201-4371-8936-3DCA4D4F9BC3}" type="datetimeFigureOut">
               <a:rPr lang="de-DE" smtClean="0"/>
               <a:pPr/>
-              <a:t>26.05.2012</a:t>
+              <a:t>02.08.2012</a:t>
             </a:fld>
             <a:endParaRPr lang="de-DE"/>
           </a:p>
@@ -2688,7 +2689,7 @@
             <a:fld id="{7CBDB685-D201-4371-8936-3DCA4D4F9BC3}" type="datetimeFigureOut">
               <a:rPr lang="de-DE" smtClean="0"/>
               <a:pPr/>
-              <a:t>26.05.2012</a:t>
+              <a:t>02.08.2012</a:t>
             </a:fld>
             <a:endParaRPr lang="de-DE"/>
           </a:p>
@@ -3078,7 +3079,7 @@
         </p:blipFill>
         <p:spPr bwMode="auto">
           <a:xfrm>
-            <a:off x="611560" y="980728"/>
+            <a:off x="827584" y="980728"/>
             <a:ext cx="7542213" cy="1533525"/>
           </a:xfrm>
           <a:prstGeom prst="rect">
@@ -3110,7 +3111,7 @@
         </p:blipFill>
         <p:spPr bwMode="auto">
           <a:xfrm rot="10800000">
-            <a:off x="611560" y="2636910"/>
+            <a:off x="774203" y="4077069"/>
             <a:ext cx="3707520" cy="2520281"/>
           </a:xfrm>
           <a:prstGeom prst="rect">
@@ -3142,7 +3143,1205 @@
         </p:blipFill>
         <p:spPr bwMode="auto">
           <a:xfrm rot="10800000">
-            <a:off x="4427985" y="2636912"/>
+            <a:off x="4590628" y="4077071"/>
+            <a:ext cx="3707519" cy="2520280"/>
+          </a:xfrm>
+          <a:prstGeom prst="rect">
+            <a:avLst/>
+          </a:prstGeom>
+          <a:noFill/>
+          <a:ln w="9525">
+            <a:noFill/>
+            <a:miter lim="800000"/>
+            <a:headEnd/>
+            <a:tailEnd/>
+          </a:ln>
+        </p:spPr>
+      </p:pic>
+      <p:grpSp>
+        <p:nvGrpSpPr>
+          <p:cNvPr id="27" name="Gruppieren 26"/>
+          <p:cNvGrpSpPr/>
+          <p:nvPr/>
+        </p:nvGrpSpPr>
+        <p:grpSpPr>
+          <a:xfrm>
+            <a:off x="5268227" y="2492896"/>
+            <a:ext cx="432048" cy="432048"/>
+            <a:chOff x="5268227" y="2492896"/>
+            <a:chExt cx="432048" cy="432048"/>
+          </a:xfrm>
+        </p:grpSpPr>
+        <p:cxnSp>
+          <p:nvCxnSpPr>
+            <p:cNvPr id="6" name="Gerade Verbindung 5"/>
+            <p:cNvCxnSpPr/>
+            <p:nvPr/>
+          </p:nvCxnSpPr>
+          <p:spPr>
+            <a:xfrm>
+              <a:off x="5484251" y="2492896"/>
+              <a:ext cx="0" cy="288032"/>
+            </a:xfrm>
+            <a:prstGeom prst="line">
+              <a:avLst/>
+            </a:prstGeom>
+            <a:ln w="28575">
+              <a:solidFill>
+                <a:schemeClr val="tx1"/>
+              </a:solidFill>
+            </a:ln>
+          </p:spPr>
+          <p:style>
+            <a:lnRef idx="1">
+              <a:schemeClr val="accent1"/>
+            </a:lnRef>
+            <a:fillRef idx="0">
+              <a:schemeClr val="accent1"/>
+            </a:fillRef>
+            <a:effectRef idx="0">
+              <a:schemeClr val="accent1"/>
+            </a:effectRef>
+            <a:fontRef idx="minor">
+              <a:schemeClr val="tx1"/>
+            </a:fontRef>
+          </p:style>
+        </p:cxnSp>
+        <p:cxnSp>
+          <p:nvCxnSpPr>
+            <p:cNvPr id="8" name="Gerade Verbindung 7"/>
+            <p:cNvCxnSpPr/>
+            <p:nvPr/>
+          </p:nvCxnSpPr>
+          <p:spPr>
+            <a:xfrm>
+              <a:off x="5268227" y="2780928"/>
+              <a:ext cx="432048" cy="0"/>
+            </a:xfrm>
+            <a:prstGeom prst="line">
+              <a:avLst/>
+            </a:prstGeom>
+            <a:ln w="28575">
+              <a:solidFill>
+                <a:schemeClr val="tx1"/>
+              </a:solidFill>
+            </a:ln>
+          </p:spPr>
+          <p:style>
+            <a:lnRef idx="1">
+              <a:schemeClr val="accent1"/>
+            </a:lnRef>
+            <a:fillRef idx="0">
+              <a:schemeClr val="accent1"/>
+            </a:fillRef>
+            <a:effectRef idx="0">
+              <a:schemeClr val="accent1"/>
+            </a:effectRef>
+            <a:fontRef idx="minor">
+              <a:schemeClr val="tx1"/>
+            </a:fontRef>
+          </p:style>
+        </p:cxnSp>
+        <p:cxnSp>
+          <p:nvCxnSpPr>
+            <p:cNvPr id="10" name="Gerade Verbindung 9"/>
+            <p:cNvCxnSpPr/>
+            <p:nvPr/>
+          </p:nvCxnSpPr>
+          <p:spPr>
+            <a:xfrm>
+              <a:off x="5340235" y="2852936"/>
+              <a:ext cx="288032" cy="0"/>
+            </a:xfrm>
+            <a:prstGeom prst="line">
+              <a:avLst/>
+            </a:prstGeom>
+            <a:ln w="28575">
+              <a:solidFill>
+                <a:schemeClr val="tx1"/>
+              </a:solidFill>
+            </a:ln>
+          </p:spPr>
+          <p:style>
+            <a:lnRef idx="1">
+              <a:schemeClr val="accent1"/>
+            </a:lnRef>
+            <a:fillRef idx="0">
+              <a:schemeClr val="accent1"/>
+            </a:fillRef>
+            <a:effectRef idx="0">
+              <a:schemeClr val="accent1"/>
+            </a:effectRef>
+            <a:fontRef idx="minor">
+              <a:schemeClr val="tx1"/>
+            </a:fontRef>
+          </p:style>
+        </p:cxnSp>
+        <p:cxnSp>
+          <p:nvCxnSpPr>
+            <p:cNvPr id="12" name="Gerade Verbindung 11"/>
+            <p:cNvCxnSpPr/>
+            <p:nvPr/>
+          </p:nvCxnSpPr>
+          <p:spPr>
+            <a:xfrm>
+              <a:off x="5412243" y="2924944"/>
+              <a:ext cx="144016" cy="0"/>
+            </a:xfrm>
+            <a:prstGeom prst="line">
+              <a:avLst/>
+            </a:prstGeom>
+            <a:ln w="28575">
+              <a:solidFill>
+                <a:schemeClr val="tx1"/>
+              </a:solidFill>
+            </a:ln>
+          </p:spPr>
+          <p:style>
+            <a:lnRef idx="1">
+              <a:schemeClr val="accent1"/>
+            </a:lnRef>
+            <a:fillRef idx="0">
+              <a:schemeClr val="accent1"/>
+            </a:fillRef>
+            <a:effectRef idx="0">
+              <a:schemeClr val="accent1"/>
+            </a:effectRef>
+            <a:fontRef idx="minor">
+              <a:schemeClr val="tx1"/>
+            </a:fontRef>
+          </p:style>
+        </p:cxnSp>
+      </p:grpSp>
+      <p:grpSp>
+        <p:nvGrpSpPr>
+          <p:cNvPr id="17" name="Gruppieren 16"/>
+          <p:cNvGrpSpPr/>
+          <p:nvPr/>
+        </p:nvGrpSpPr>
+        <p:grpSpPr>
+          <a:xfrm rot="10800000">
+            <a:off x="5268227" y="540729"/>
+            <a:ext cx="432048" cy="432048"/>
+            <a:chOff x="5508104" y="404664"/>
+            <a:chExt cx="432048" cy="432048"/>
+          </a:xfrm>
+        </p:grpSpPr>
+        <p:cxnSp>
+          <p:nvCxnSpPr>
+            <p:cNvPr id="13" name="Gerade Verbindung 12"/>
+            <p:cNvCxnSpPr/>
+            <p:nvPr/>
+          </p:nvCxnSpPr>
+          <p:spPr>
+            <a:xfrm>
+              <a:off x="5724128" y="404664"/>
+              <a:ext cx="0" cy="288032"/>
+            </a:xfrm>
+            <a:prstGeom prst="line">
+              <a:avLst/>
+            </a:prstGeom>
+            <a:ln w="28575">
+              <a:solidFill>
+                <a:schemeClr val="tx1"/>
+              </a:solidFill>
+            </a:ln>
+          </p:spPr>
+          <p:style>
+            <a:lnRef idx="1">
+              <a:schemeClr val="accent1"/>
+            </a:lnRef>
+            <a:fillRef idx="0">
+              <a:schemeClr val="accent1"/>
+            </a:fillRef>
+            <a:effectRef idx="0">
+              <a:schemeClr val="accent1"/>
+            </a:effectRef>
+            <a:fontRef idx="minor">
+              <a:schemeClr val="tx1"/>
+            </a:fontRef>
+          </p:style>
+        </p:cxnSp>
+        <p:cxnSp>
+          <p:nvCxnSpPr>
+            <p:cNvPr id="14" name="Gerade Verbindung 13"/>
+            <p:cNvCxnSpPr/>
+            <p:nvPr/>
+          </p:nvCxnSpPr>
+          <p:spPr>
+            <a:xfrm>
+              <a:off x="5508104" y="692696"/>
+              <a:ext cx="432048" cy="0"/>
+            </a:xfrm>
+            <a:prstGeom prst="line">
+              <a:avLst/>
+            </a:prstGeom>
+            <a:ln w="28575">
+              <a:solidFill>
+                <a:schemeClr val="tx1"/>
+              </a:solidFill>
+            </a:ln>
+          </p:spPr>
+          <p:style>
+            <a:lnRef idx="1">
+              <a:schemeClr val="accent1"/>
+            </a:lnRef>
+            <a:fillRef idx="0">
+              <a:schemeClr val="accent1"/>
+            </a:fillRef>
+            <a:effectRef idx="0">
+              <a:schemeClr val="accent1"/>
+            </a:effectRef>
+            <a:fontRef idx="minor">
+              <a:schemeClr val="tx1"/>
+            </a:fontRef>
+          </p:style>
+        </p:cxnSp>
+        <p:cxnSp>
+          <p:nvCxnSpPr>
+            <p:cNvPr id="15" name="Gerade Verbindung 14"/>
+            <p:cNvCxnSpPr/>
+            <p:nvPr/>
+          </p:nvCxnSpPr>
+          <p:spPr>
+            <a:xfrm>
+              <a:off x="5580112" y="764704"/>
+              <a:ext cx="288032" cy="0"/>
+            </a:xfrm>
+            <a:prstGeom prst="line">
+              <a:avLst/>
+            </a:prstGeom>
+            <a:ln w="28575">
+              <a:solidFill>
+                <a:schemeClr val="tx1"/>
+              </a:solidFill>
+            </a:ln>
+          </p:spPr>
+          <p:style>
+            <a:lnRef idx="1">
+              <a:schemeClr val="accent1"/>
+            </a:lnRef>
+            <a:fillRef idx="0">
+              <a:schemeClr val="accent1"/>
+            </a:fillRef>
+            <a:effectRef idx="0">
+              <a:schemeClr val="accent1"/>
+            </a:effectRef>
+            <a:fontRef idx="minor">
+              <a:schemeClr val="tx1"/>
+            </a:fontRef>
+          </p:style>
+        </p:cxnSp>
+        <p:cxnSp>
+          <p:nvCxnSpPr>
+            <p:cNvPr id="16" name="Gerade Verbindung 15"/>
+            <p:cNvCxnSpPr/>
+            <p:nvPr/>
+          </p:nvCxnSpPr>
+          <p:spPr>
+            <a:xfrm>
+              <a:off x="5652120" y="836712"/>
+              <a:ext cx="144016" cy="0"/>
+            </a:xfrm>
+            <a:prstGeom prst="line">
+              <a:avLst/>
+            </a:prstGeom>
+            <a:ln w="28575">
+              <a:solidFill>
+                <a:schemeClr val="tx1"/>
+              </a:solidFill>
+            </a:ln>
+          </p:spPr>
+          <p:style>
+            <a:lnRef idx="1">
+              <a:schemeClr val="accent1"/>
+            </a:lnRef>
+            <a:fillRef idx="0">
+              <a:schemeClr val="accent1"/>
+            </a:fillRef>
+            <a:effectRef idx="0">
+              <a:schemeClr val="accent1"/>
+            </a:effectRef>
+            <a:fontRef idx="minor">
+              <a:schemeClr val="tx1"/>
+            </a:fontRef>
+          </p:style>
+        </p:cxnSp>
+      </p:grpSp>
+      <p:grpSp>
+        <p:nvGrpSpPr>
+          <p:cNvPr id="20" name="Gruppieren 19"/>
+          <p:cNvGrpSpPr/>
+          <p:nvPr/>
+        </p:nvGrpSpPr>
+        <p:grpSpPr>
+          <a:xfrm rot="16200000">
+            <a:off x="3347864" y="2852936"/>
+            <a:ext cx="504056" cy="360040"/>
+            <a:chOff x="3203848" y="2852936"/>
+            <a:chExt cx="504056" cy="360040"/>
+          </a:xfrm>
+        </p:grpSpPr>
+        <p:sp>
+          <p:nvSpPr>
+            <p:cNvPr id="18" name="Ellipse 17"/>
+            <p:cNvSpPr/>
+            <p:nvPr/>
+          </p:nvSpPr>
+          <p:spPr>
+            <a:xfrm>
+              <a:off x="3203848" y="2852936"/>
+              <a:ext cx="360040" cy="360040"/>
+            </a:xfrm>
+            <a:prstGeom prst="ellipse">
+              <a:avLst/>
+            </a:prstGeom>
+            <a:noFill/>
+            <a:ln>
+              <a:solidFill>
+                <a:schemeClr val="tx1"/>
+              </a:solidFill>
+            </a:ln>
+          </p:spPr>
+          <p:style>
+            <a:lnRef idx="2">
+              <a:schemeClr val="accent1">
+                <a:shade val="50000"/>
+              </a:schemeClr>
+            </a:lnRef>
+            <a:fillRef idx="1">
+              <a:schemeClr val="accent1"/>
+            </a:fillRef>
+            <a:effectRef idx="0">
+              <a:schemeClr val="accent1"/>
+            </a:effectRef>
+            <a:fontRef idx="minor">
+              <a:schemeClr val="lt1"/>
+            </a:fontRef>
+          </p:style>
+          <p:txBody>
+            <a:bodyPr rtlCol="0" anchor="ctr"/>
+            <a:lstStyle/>
+            <a:p>
+              <a:pPr algn="ctr"/>
+              <a:endParaRPr lang="de-DE"/>
+            </a:p>
+          </p:txBody>
+        </p:sp>
+        <p:sp>
+          <p:nvSpPr>
+            <p:cNvPr id="19" name="Ellipse 18"/>
+            <p:cNvSpPr/>
+            <p:nvPr/>
+          </p:nvSpPr>
+          <p:spPr>
+            <a:xfrm>
+              <a:off x="3347864" y="2852936"/>
+              <a:ext cx="360040" cy="360040"/>
+            </a:xfrm>
+            <a:prstGeom prst="ellipse">
+              <a:avLst/>
+            </a:prstGeom>
+            <a:noFill/>
+            <a:ln>
+              <a:solidFill>
+                <a:schemeClr val="tx1"/>
+              </a:solidFill>
+            </a:ln>
+          </p:spPr>
+          <p:style>
+            <a:lnRef idx="2">
+              <a:schemeClr val="accent1">
+                <a:shade val="50000"/>
+              </a:schemeClr>
+            </a:lnRef>
+            <a:fillRef idx="1">
+              <a:schemeClr val="accent1"/>
+            </a:fillRef>
+            <a:effectRef idx="0">
+              <a:schemeClr val="accent1"/>
+            </a:effectRef>
+            <a:fontRef idx="minor">
+              <a:schemeClr val="lt1"/>
+            </a:fontRef>
+          </p:style>
+          <p:txBody>
+            <a:bodyPr rtlCol="0" anchor="ctr"/>
+            <a:lstStyle/>
+            <a:p>
+              <a:pPr algn="ctr"/>
+              <a:endParaRPr lang="de-DE"/>
+            </a:p>
+          </p:txBody>
+        </p:sp>
+      </p:grpSp>
+      <p:cxnSp>
+        <p:nvCxnSpPr>
+          <p:cNvPr id="21" name="Gerade Verbindung 20"/>
+          <p:cNvCxnSpPr/>
+          <p:nvPr/>
+        </p:nvCxnSpPr>
+        <p:spPr>
+          <a:xfrm>
+            <a:off x="3603643" y="2492896"/>
+            <a:ext cx="0" cy="288032"/>
+          </a:xfrm>
+          <a:prstGeom prst="line">
+            <a:avLst/>
+          </a:prstGeom>
+          <a:ln w="28575">
+            <a:solidFill>
+              <a:schemeClr val="tx1"/>
+            </a:solidFill>
+          </a:ln>
+        </p:spPr>
+        <p:style>
+          <a:lnRef idx="1">
+            <a:schemeClr val="accent1"/>
+          </a:lnRef>
+          <a:fillRef idx="0">
+            <a:schemeClr val="accent1"/>
+          </a:fillRef>
+          <a:effectRef idx="0">
+            <a:schemeClr val="accent1"/>
+          </a:effectRef>
+          <a:fontRef idx="minor">
+            <a:schemeClr val="tx1"/>
+          </a:fontRef>
+        </p:style>
+      </p:cxnSp>
+      <p:grpSp>
+        <p:nvGrpSpPr>
+          <p:cNvPr id="26" name="Gruppieren 25"/>
+          <p:cNvGrpSpPr/>
+          <p:nvPr/>
+        </p:nvGrpSpPr>
+        <p:grpSpPr>
+          <a:xfrm>
+            <a:off x="3388068" y="3301335"/>
+            <a:ext cx="432048" cy="432048"/>
+            <a:chOff x="5420627" y="2645296"/>
+            <a:chExt cx="432048" cy="432048"/>
+          </a:xfrm>
+        </p:grpSpPr>
+        <p:cxnSp>
+          <p:nvCxnSpPr>
+            <p:cNvPr id="22" name="Gerade Verbindung 21"/>
+            <p:cNvCxnSpPr/>
+            <p:nvPr/>
+          </p:nvCxnSpPr>
+          <p:spPr>
+            <a:xfrm>
+              <a:off x="5636651" y="2645296"/>
+              <a:ext cx="0" cy="288032"/>
+            </a:xfrm>
+            <a:prstGeom prst="line">
+              <a:avLst/>
+            </a:prstGeom>
+            <a:ln w="28575">
+              <a:solidFill>
+                <a:schemeClr val="tx1"/>
+              </a:solidFill>
+            </a:ln>
+          </p:spPr>
+          <p:style>
+            <a:lnRef idx="1">
+              <a:schemeClr val="accent1"/>
+            </a:lnRef>
+            <a:fillRef idx="0">
+              <a:schemeClr val="accent1"/>
+            </a:fillRef>
+            <a:effectRef idx="0">
+              <a:schemeClr val="accent1"/>
+            </a:effectRef>
+            <a:fontRef idx="minor">
+              <a:schemeClr val="tx1"/>
+            </a:fontRef>
+          </p:style>
+        </p:cxnSp>
+        <p:cxnSp>
+          <p:nvCxnSpPr>
+            <p:cNvPr id="23" name="Gerade Verbindung 22"/>
+            <p:cNvCxnSpPr/>
+            <p:nvPr/>
+          </p:nvCxnSpPr>
+          <p:spPr>
+            <a:xfrm>
+              <a:off x="5420627" y="2933328"/>
+              <a:ext cx="432048" cy="0"/>
+            </a:xfrm>
+            <a:prstGeom prst="line">
+              <a:avLst/>
+            </a:prstGeom>
+            <a:ln w="28575">
+              <a:solidFill>
+                <a:schemeClr val="tx1"/>
+              </a:solidFill>
+            </a:ln>
+          </p:spPr>
+          <p:style>
+            <a:lnRef idx="1">
+              <a:schemeClr val="accent1"/>
+            </a:lnRef>
+            <a:fillRef idx="0">
+              <a:schemeClr val="accent1"/>
+            </a:fillRef>
+            <a:effectRef idx="0">
+              <a:schemeClr val="accent1"/>
+            </a:effectRef>
+            <a:fontRef idx="minor">
+              <a:schemeClr val="tx1"/>
+            </a:fontRef>
+          </p:style>
+        </p:cxnSp>
+        <p:cxnSp>
+          <p:nvCxnSpPr>
+            <p:cNvPr id="24" name="Gerade Verbindung 23"/>
+            <p:cNvCxnSpPr/>
+            <p:nvPr/>
+          </p:nvCxnSpPr>
+          <p:spPr>
+            <a:xfrm>
+              <a:off x="5492635" y="3005336"/>
+              <a:ext cx="288032" cy="0"/>
+            </a:xfrm>
+            <a:prstGeom prst="line">
+              <a:avLst/>
+            </a:prstGeom>
+            <a:ln w="28575">
+              <a:solidFill>
+                <a:schemeClr val="tx1"/>
+              </a:solidFill>
+            </a:ln>
+          </p:spPr>
+          <p:style>
+            <a:lnRef idx="1">
+              <a:schemeClr val="accent1"/>
+            </a:lnRef>
+            <a:fillRef idx="0">
+              <a:schemeClr val="accent1"/>
+            </a:fillRef>
+            <a:effectRef idx="0">
+              <a:schemeClr val="accent1"/>
+            </a:effectRef>
+            <a:fontRef idx="minor">
+              <a:schemeClr val="tx1"/>
+            </a:fontRef>
+          </p:style>
+        </p:cxnSp>
+        <p:cxnSp>
+          <p:nvCxnSpPr>
+            <p:cNvPr id="25" name="Gerade Verbindung 24"/>
+            <p:cNvCxnSpPr/>
+            <p:nvPr/>
+          </p:nvCxnSpPr>
+          <p:spPr>
+            <a:xfrm>
+              <a:off x="5564643" y="3077344"/>
+              <a:ext cx="144016" cy="0"/>
+            </a:xfrm>
+            <a:prstGeom prst="line">
+              <a:avLst/>
+            </a:prstGeom>
+            <a:ln w="28575">
+              <a:solidFill>
+                <a:schemeClr val="tx1"/>
+              </a:solidFill>
+            </a:ln>
+          </p:spPr>
+          <p:style>
+            <a:lnRef idx="1">
+              <a:schemeClr val="accent1"/>
+            </a:lnRef>
+            <a:fillRef idx="0">
+              <a:schemeClr val="accent1"/>
+            </a:fillRef>
+            <a:effectRef idx="0">
+              <a:schemeClr val="accent1"/>
+            </a:effectRef>
+            <a:fontRef idx="minor">
+              <a:schemeClr val="tx1"/>
+            </a:fontRef>
+          </p:style>
+        </p:cxnSp>
+      </p:grpSp>
+      <p:grpSp>
+        <p:nvGrpSpPr>
+          <p:cNvPr id="48" name="Gruppieren 47"/>
+          <p:cNvGrpSpPr/>
+          <p:nvPr/>
+        </p:nvGrpSpPr>
+        <p:grpSpPr>
+          <a:xfrm>
+            <a:off x="44708" y="1507440"/>
+            <a:ext cx="808644" cy="411804"/>
+            <a:chOff x="44708" y="1507440"/>
+            <a:chExt cx="808644" cy="411804"/>
+          </a:xfrm>
+        </p:grpSpPr>
+        <p:sp>
+          <p:nvSpPr>
+            <p:cNvPr id="33" name="Ellipse 32"/>
+            <p:cNvSpPr/>
+            <p:nvPr/>
+          </p:nvSpPr>
+          <p:spPr>
+            <a:xfrm>
+              <a:off x="573720" y="1601638"/>
+              <a:ext cx="144016" cy="216024"/>
+            </a:xfrm>
+            <a:prstGeom prst="ellipse">
+              <a:avLst/>
+            </a:prstGeom>
+            <a:noFill/>
+            <a:ln w="19050">
+              <a:solidFill>
+                <a:schemeClr val="tx1"/>
+              </a:solidFill>
+            </a:ln>
+          </p:spPr>
+          <p:style>
+            <a:lnRef idx="2">
+              <a:schemeClr val="accent1">
+                <a:shade val="50000"/>
+              </a:schemeClr>
+            </a:lnRef>
+            <a:fillRef idx="1">
+              <a:schemeClr val="accent1"/>
+            </a:fillRef>
+            <a:effectRef idx="0">
+              <a:schemeClr val="accent1"/>
+            </a:effectRef>
+            <a:fontRef idx="minor">
+              <a:schemeClr val="lt1"/>
+            </a:fontRef>
+          </p:style>
+          <p:txBody>
+            <a:bodyPr rtlCol="0" anchor="ctr"/>
+            <a:lstStyle/>
+            <a:p>
+              <a:pPr algn="ctr"/>
+              <a:endParaRPr lang="de-DE"/>
+            </a:p>
+          </p:txBody>
+        </p:sp>
+        <p:cxnSp>
+          <p:nvCxnSpPr>
+            <p:cNvPr id="35" name="Gerade Verbindung 34"/>
+            <p:cNvCxnSpPr>
+              <a:stCxn id="33" idx="0"/>
+            </p:cNvCxnSpPr>
+            <p:nvPr/>
+          </p:nvCxnSpPr>
+          <p:spPr>
+            <a:xfrm flipH="1">
+              <a:off x="141673" y="1601638"/>
+              <a:ext cx="504055" cy="0"/>
+            </a:xfrm>
+            <a:prstGeom prst="line">
+              <a:avLst/>
+            </a:prstGeom>
+            <a:ln w="19050">
+              <a:solidFill>
+                <a:schemeClr val="tx1"/>
+              </a:solidFill>
+            </a:ln>
+          </p:spPr>
+          <p:style>
+            <a:lnRef idx="1">
+              <a:schemeClr val="accent1"/>
+            </a:lnRef>
+            <a:fillRef idx="0">
+              <a:schemeClr val="accent1"/>
+            </a:fillRef>
+            <a:effectRef idx="0">
+              <a:schemeClr val="accent1"/>
+            </a:effectRef>
+            <a:fontRef idx="minor">
+              <a:schemeClr val="tx1"/>
+            </a:fontRef>
+          </p:style>
+        </p:cxnSp>
+        <p:cxnSp>
+          <p:nvCxnSpPr>
+            <p:cNvPr id="37" name="Gerade Verbindung 36"/>
+            <p:cNvCxnSpPr/>
+            <p:nvPr/>
+          </p:nvCxnSpPr>
+          <p:spPr>
+            <a:xfrm flipH="1">
+              <a:off x="149623" y="1816559"/>
+              <a:ext cx="504055" cy="0"/>
+            </a:xfrm>
+            <a:prstGeom prst="line">
+              <a:avLst/>
+            </a:prstGeom>
+            <a:ln w="19050">
+              <a:solidFill>
+                <a:schemeClr val="tx1"/>
+              </a:solidFill>
+            </a:ln>
+          </p:spPr>
+          <p:style>
+            <a:lnRef idx="1">
+              <a:schemeClr val="accent1"/>
+            </a:lnRef>
+            <a:fillRef idx="0">
+              <a:schemeClr val="accent1"/>
+            </a:fillRef>
+            <a:effectRef idx="0">
+              <a:schemeClr val="accent1"/>
+            </a:effectRef>
+            <a:fontRef idx="minor">
+              <a:schemeClr val="tx1"/>
+            </a:fontRef>
+          </p:style>
+        </p:cxnSp>
+        <p:grpSp>
+          <p:nvGrpSpPr>
+            <p:cNvPr id="47" name="Gruppieren 46"/>
+            <p:cNvGrpSpPr/>
+            <p:nvPr/>
+          </p:nvGrpSpPr>
+          <p:grpSpPr>
+            <a:xfrm rot="312488">
+              <a:off x="44708" y="1507440"/>
+              <a:ext cx="139433" cy="411804"/>
+              <a:chOff x="59798" y="1534602"/>
+              <a:chExt cx="139433" cy="411804"/>
+            </a:xfrm>
+          </p:grpSpPr>
+          <p:sp>
+            <p:nvSpPr>
+              <p:cNvPr id="38" name="Freihandform 37"/>
+              <p:cNvSpPr/>
+              <p:nvPr/>
+            </p:nvSpPr>
+            <p:spPr>
+              <a:xfrm>
+                <a:off x="110840" y="1534602"/>
+                <a:ext cx="88391" cy="389614"/>
+              </a:xfrm>
+              <a:custGeom>
+                <a:avLst/>
+                <a:gdLst>
+                  <a:gd name="connsiteX0" fmla="*/ 8878 w 88391"/>
+                  <a:gd name="connsiteY0" fmla="*/ 0 h 389614"/>
+                  <a:gd name="connsiteX1" fmla="*/ 926 w 88391"/>
+                  <a:gd name="connsiteY1" fmla="*/ 23854 h 389614"/>
+                  <a:gd name="connsiteX2" fmla="*/ 16829 w 88391"/>
+                  <a:gd name="connsiteY2" fmla="*/ 71561 h 389614"/>
+                  <a:gd name="connsiteX3" fmla="*/ 24780 w 88391"/>
+                  <a:gd name="connsiteY3" fmla="*/ 103367 h 389614"/>
+                  <a:gd name="connsiteX4" fmla="*/ 32732 w 88391"/>
+                  <a:gd name="connsiteY4" fmla="*/ 206734 h 389614"/>
+                  <a:gd name="connsiteX5" fmla="*/ 48634 w 88391"/>
+                  <a:gd name="connsiteY5" fmla="*/ 230588 h 389614"/>
+                  <a:gd name="connsiteX6" fmla="*/ 64537 w 88391"/>
+                  <a:gd name="connsiteY6" fmla="*/ 262393 h 389614"/>
+                  <a:gd name="connsiteX7" fmla="*/ 80439 w 88391"/>
+                  <a:gd name="connsiteY7" fmla="*/ 357808 h 389614"/>
+                  <a:gd name="connsiteX8" fmla="*/ 88391 w 88391"/>
+                  <a:gd name="connsiteY8" fmla="*/ 389614 h 389614"/>
+                </a:gdLst>
+                <a:ahLst/>
+                <a:cxnLst>
+                  <a:cxn ang="0">
+                    <a:pos x="connsiteX0" y="connsiteY0"/>
+                  </a:cxn>
+                  <a:cxn ang="0">
+                    <a:pos x="connsiteX1" y="connsiteY1"/>
+                  </a:cxn>
+                  <a:cxn ang="0">
+                    <a:pos x="connsiteX2" y="connsiteY2"/>
+                  </a:cxn>
+                  <a:cxn ang="0">
+                    <a:pos x="connsiteX3" y="connsiteY3"/>
+                  </a:cxn>
+                  <a:cxn ang="0">
+                    <a:pos x="connsiteX4" y="connsiteY4"/>
+                  </a:cxn>
+                  <a:cxn ang="0">
+                    <a:pos x="connsiteX5" y="connsiteY5"/>
+                  </a:cxn>
+                  <a:cxn ang="0">
+                    <a:pos x="connsiteX6" y="connsiteY6"/>
+                  </a:cxn>
+                  <a:cxn ang="0">
+                    <a:pos x="connsiteX7" y="connsiteY7"/>
+                  </a:cxn>
+                  <a:cxn ang="0">
+                    <a:pos x="connsiteX8" y="connsiteY8"/>
+                  </a:cxn>
+                </a:cxnLst>
+                <a:rect l="l" t="t" r="r" b="b"/>
+                <a:pathLst>
+                  <a:path w="88391" h="389614">
+                    <a:moveTo>
+                      <a:pt x="8878" y="0"/>
+                    </a:moveTo>
+                    <a:cubicBezTo>
+                      <a:pt x="6227" y="7951"/>
+                      <a:pt x="0" y="15524"/>
+                      <a:pt x="926" y="23854"/>
+                    </a:cubicBezTo>
+                    <a:cubicBezTo>
+                      <a:pt x="2777" y="40514"/>
+                      <a:pt x="12764" y="55299"/>
+                      <a:pt x="16829" y="71561"/>
+                    </a:cubicBezTo>
+                    <a:lnTo>
+                      <a:pt x="24780" y="103367"/>
+                    </a:lnTo>
+                    <a:cubicBezTo>
+                      <a:pt x="27431" y="137823"/>
+                      <a:pt x="26363" y="172768"/>
+                      <a:pt x="32732" y="206734"/>
+                    </a:cubicBezTo>
+                    <a:cubicBezTo>
+                      <a:pt x="34493" y="216127"/>
+                      <a:pt x="43893" y="222291"/>
+                      <a:pt x="48634" y="230588"/>
+                    </a:cubicBezTo>
+                    <a:cubicBezTo>
+                      <a:pt x="54515" y="240879"/>
+                      <a:pt x="59236" y="251791"/>
+                      <a:pt x="64537" y="262393"/>
+                    </a:cubicBezTo>
+                    <a:cubicBezTo>
+                      <a:pt x="77458" y="378688"/>
+                      <a:pt x="63486" y="298474"/>
+                      <a:pt x="80439" y="357808"/>
+                    </a:cubicBezTo>
+                    <a:cubicBezTo>
+                      <a:pt x="83441" y="368316"/>
+                      <a:pt x="88391" y="389614"/>
+                      <a:pt x="88391" y="389614"/>
+                    </a:cubicBezTo>
+                  </a:path>
+                </a:pathLst>
+              </a:custGeom>
+              <a:ln w="19050">
+                <a:solidFill>
+                  <a:schemeClr val="tx1"/>
+                </a:solidFill>
+              </a:ln>
+            </p:spPr>
+            <p:style>
+              <a:lnRef idx="1">
+                <a:schemeClr val="accent1"/>
+              </a:lnRef>
+              <a:fillRef idx="0">
+                <a:schemeClr val="accent1"/>
+              </a:fillRef>
+              <a:effectRef idx="0">
+                <a:schemeClr val="accent1"/>
+              </a:effectRef>
+              <a:fontRef idx="minor">
+                <a:schemeClr val="tx1"/>
+              </a:fontRef>
+            </p:style>
+            <p:txBody>
+              <a:bodyPr rtlCol="0" anchor="ctr"/>
+              <a:lstStyle/>
+              <a:p>
+                <a:pPr algn="ctr"/>
+                <a:endParaRPr lang="de-DE"/>
+              </a:p>
+            </p:txBody>
+          </p:sp>
+          <p:sp>
+            <p:nvSpPr>
+              <p:cNvPr id="39" name="Freihandform 38"/>
+              <p:cNvSpPr/>
+              <p:nvPr/>
+            </p:nvSpPr>
+            <p:spPr>
+              <a:xfrm>
+                <a:off x="59798" y="1556792"/>
+                <a:ext cx="88391" cy="389614"/>
+              </a:xfrm>
+              <a:custGeom>
+                <a:avLst/>
+                <a:gdLst>
+                  <a:gd name="connsiteX0" fmla="*/ 8878 w 88391"/>
+                  <a:gd name="connsiteY0" fmla="*/ 0 h 389614"/>
+                  <a:gd name="connsiteX1" fmla="*/ 926 w 88391"/>
+                  <a:gd name="connsiteY1" fmla="*/ 23854 h 389614"/>
+                  <a:gd name="connsiteX2" fmla="*/ 16829 w 88391"/>
+                  <a:gd name="connsiteY2" fmla="*/ 71561 h 389614"/>
+                  <a:gd name="connsiteX3" fmla="*/ 24780 w 88391"/>
+                  <a:gd name="connsiteY3" fmla="*/ 103367 h 389614"/>
+                  <a:gd name="connsiteX4" fmla="*/ 32732 w 88391"/>
+                  <a:gd name="connsiteY4" fmla="*/ 206734 h 389614"/>
+                  <a:gd name="connsiteX5" fmla="*/ 48634 w 88391"/>
+                  <a:gd name="connsiteY5" fmla="*/ 230588 h 389614"/>
+                  <a:gd name="connsiteX6" fmla="*/ 64537 w 88391"/>
+                  <a:gd name="connsiteY6" fmla="*/ 262393 h 389614"/>
+                  <a:gd name="connsiteX7" fmla="*/ 80439 w 88391"/>
+                  <a:gd name="connsiteY7" fmla="*/ 357808 h 389614"/>
+                  <a:gd name="connsiteX8" fmla="*/ 88391 w 88391"/>
+                  <a:gd name="connsiteY8" fmla="*/ 389614 h 389614"/>
+                </a:gdLst>
+                <a:ahLst/>
+                <a:cxnLst>
+                  <a:cxn ang="0">
+                    <a:pos x="connsiteX0" y="connsiteY0"/>
+                  </a:cxn>
+                  <a:cxn ang="0">
+                    <a:pos x="connsiteX1" y="connsiteY1"/>
+                  </a:cxn>
+                  <a:cxn ang="0">
+                    <a:pos x="connsiteX2" y="connsiteY2"/>
+                  </a:cxn>
+                  <a:cxn ang="0">
+                    <a:pos x="connsiteX3" y="connsiteY3"/>
+                  </a:cxn>
+                  <a:cxn ang="0">
+                    <a:pos x="connsiteX4" y="connsiteY4"/>
+                  </a:cxn>
+                  <a:cxn ang="0">
+                    <a:pos x="connsiteX5" y="connsiteY5"/>
+                  </a:cxn>
+                  <a:cxn ang="0">
+                    <a:pos x="connsiteX6" y="connsiteY6"/>
+                  </a:cxn>
+                  <a:cxn ang="0">
+                    <a:pos x="connsiteX7" y="connsiteY7"/>
+                  </a:cxn>
+                  <a:cxn ang="0">
+                    <a:pos x="connsiteX8" y="connsiteY8"/>
+                  </a:cxn>
+                </a:cxnLst>
+                <a:rect l="l" t="t" r="r" b="b"/>
+                <a:pathLst>
+                  <a:path w="88391" h="389614">
+                    <a:moveTo>
+                      <a:pt x="8878" y="0"/>
+                    </a:moveTo>
+                    <a:cubicBezTo>
+                      <a:pt x="6227" y="7951"/>
+                      <a:pt x="0" y="15524"/>
+                      <a:pt x="926" y="23854"/>
+                    </a:cubicBezTo>
+                    <a:cubicBezTo>
+                      <a:pt x="2777" y="40514"/>
+                      <a:pt x="12764" y="55299"/>
+                      <a:pt x="16829" y="71561"/>
+                    </a:cubicBezTo>
+                    <a:lnTo>
+                      <a:pt x="24780" y="103367"/>
+                    </a:lnTo>
+                    <a:cubicBezTo>
+                      <a:pt x="27431" y="137823"/>
+                      <a:pt x="26363" y="172768"/>
+                      <a:pt x="32732" y="206734"/>
+                    </a:cubicBezTo>
+                    <a:cubicBezTo>
+                      <a:pt x="34493" y="216127"/>
+                      <a:pt x="43893" y="222291"/>
+                      <a:pt x="48634" y="230588"/>
+                    </a:cubicBezTo>
+                    <a:cubicBezTo>
+                      <a:pt x="54515" y="240879"/>
+                      <a:pt x="59236" y="251791"/>
+                      <a:pt x="64537" y="262393"/>
+                    </a:cubicBezTo>
+                    <a:cubicBezTo>
+                      <a:pt x="77458" y="378688"/>
+                      <a:pt x="63486" y="298474"/>
+                      <a:pt x="80439" y="357808"/>
+                    </a:cubicBezTo>
+                    <a:cubicBezTo>
+                      <a:pt x="83441" y="368316"/>
+                      <a:pt x="88391" y="389614"/>
+                      <a:pt x="88391" y="389614"/>
+                    </a:cubicBezTo>
+                  </a:path>
+                </a:pathLst>
+              </a:custGeom>
+              <a:ln w="19050">
+                <a:solidFill>
+                  <a:schemeClr val="tx1"/>
+                </a:solidFill>
+              </a:ln>
+            </p:spPr>
+            <p:style>
+              <a:lnRef idx="1">
+                <a:schemeClr val="accent1"/>
+              </a:lnRef>
+              <a:fillRef idx="0">
+                <a:schemeClr val="accent1"/>
+              </a:fillRef>
+              <a:effectRef idx="0">
+                <a:schemeClr val="accent1"/>
+              </a:effectRef>
+              <a:fontRef idx="minor">
+                <a:schemeClr val="tx1"/>
+              </a:fontRef>
+            </p:style>
+            <p:txBody>
+              <a:bodyPr rtlCol="0" anchor="ctr"/>
+              <a:lstStyle/>
+              <a:p>
+                <a:pPr algn="ctr"/>
+                <a:endParaRPr lang="de-DE"/>
+              </a:p>
+            </p:txBody>
+          </p:sp>
+        </p:grpSp>
+        <p:cxnSp>
+          <p:nvCxnSpPr>
+            <p:cNvPr id="42" name="Gerade Verbindung 41"/>
+            <p:cNvCxnSpPr/>
+            <p:nvPr/>
+          </p:nvCxnSpPr>
+          <p:spPr>
+            <a:xfrm flipH="1">
+              <a:off x="637328" y="1705450"/>
+              <a:ext cx="216024" cy="0"/>
+            </a:xfrm>
+            <a:prstGeom prst="line">
+              <a:avLst/>
+            </a:prstGeom>
+            <a:ln w="28575">
+              <a:solidFill>
+                <a:schemeClr val="tx1"/>
+              </a:solidFill>
+            </a:ln>
+          </p:spPr>
+          <p:style>
+            <a:lnRef idx="1">
+              <a:schemeClr val="accent1"/>
+            </a:lnRef>
+            <a:fillRef idx="0">
+              <a:schemeClr val="accent1"/>
+            </a:fillRef>
+            <a:effectRef idx="0">
+              <a:schemeClr val="accent1"/>
+            </a:effectRef>
+            <a:fontRef idx="minor">
+              <a:schemeClr val="tx1"/>
+            </a:fontRef>
+          </p:style>
+        </p:cxnSp>
+      </p:grpSp>
+    </p:spTree>
+  </p:cSld>
+  <p:clrMapOvr>
+    <a:masterClrMapping/>
+  </p:clrMapOvr>
+  <p:timing>
+    <p:tnLst>
+      <p:par>
+        <p:cTn id="1" dur="indefinite" restart="never" nodeType="tmRoot"/>
+      </p:par>
+    </p:tnLst>
+  </p:timing>
+</p:sld>
+</file>
+
+<file path=ppt/slides/slide2.xml><?xml version="1.0" encoding="utf-8"?>
+<p:sld xmlns:a="http://schemas.openxmlformats.org/drawingml/2006/main" xmlns:r="http://schemas.openxmlformats.org/officeDocument/2006/relationships" xmlns:p="http://schemas.openxmlformats.org/presentationml/2006/main">
+  <p:cSld>
+    <p:spTree>
+      <p:nvGrpSpPr>
+        <p:cNvPr id="1" name=""/>
+        <p:cNvGrpSpPr/>
+        <p:nvPr/>
+      </p:nvGrpSpPr>
+      <p:grpSpPr>
+        <a:xfrm>
+          <a:off x="0" y="0"/>
+          <a:ext cx="0" cy="0"/>
+          <a:chOff x="0" y="0"/>
+          <a:chExt cx="0" cy="0"/>
+        </a:xfrm>
+      </p:grpSpPr>
+      <p:pic>
+        <p:nvPicPr>
+          <p:cNvPr id="1026" name="Picture 2"/>
+          <p:cNvPicPr>
+            <a:picLocks noChangeAspect="1" noChangeArrowheads="1"/>
+          </p:cNvPicPr>
+          <p:nvPr/>
+        </p:nvPicPr>
+        <p:blipFill>
+          <a:blip r:embed="rId2" cstate="print">
+            <a:grayscl/>
+          </a:blip>
+          <a:srcRect/>
+          <a:stretch>
+            <a:fillRect/>
+          </a:stretch>
+        </p:blipFill>
+        <p:spPr bwMode="auto">
+          <a:xfrm>
+            <a:off x="755576" y="2471539"/>
+            <a:ext cx="7542213" cy="1533525"/>
+          </a:xfrm>
+          <a:prstGeom prst="rect">
+            <a:avLst/>
+          </a:prstGeom>
+          <a:noFill/>
+          <a:ln w="9525">
+            <a:noFill/>
+            <a:miter lim="800000"/>
+            <a:headEnd/>
+            <a:tailEnd/>
+          </a:ln>
+        </p:spPr>
+      </p:pic>
+      <p:pic>
+        <p:nvPicPr>
+          <p:cNvPr id="1028" name="Picture 4"/>
+          <p:cNvPicPr>
+            <a:picLocks noChangeAspect="1" noChangeArrowheads="1"/>
+          </p:cNvPicPr>
+          <p:nvPr/>
+        </p:nvPicPr>
+        <p:blipFill>
+          <a:blip r:embed="rId3" cstate="print"/>
+          <a:srcRect/>
+          <a:stretch>
+            <a:fillRect/>
+          </a:stretch>
+        </p:blipFill>
+        <p:spPr bwMode="auto">
+          <a:xfrm rot="10800000">
+            <a:off x="774203" y="4077069"/>
+            <a:ext cx="3707520" cy="2520281"/>
+          </a:xfrm>
+          <a:prstGeom prst="rect">
+            <a:avLst/>
+          </a:prstGeom>
+          <a:noFill/>
+          <a:ln w="9525">
+            <a:noFill/>
+            <a:miter lim="800000"/>
+            <a:headEnd/>
+            <a:tailEnd/>
+          </a:ln>
+        </p:spPr>
+      </p:pic>
+      <p:pic>
+        <p:nvPicPr>
+          <p:cNvPr id="1029" name="Picture 5"/>
+          <p:cNvPicPr>
+            <a:picLocks noChangeAspect="1" noChangeArrowheads="1"/>
+          </p:cNvPicPr>
+          <p:nvPr/>
+        </p:nvPicPr>
+        <p:blipFill>
+          <a:blip r:embed="rId4" cstate="print"/>
+          <a:srcRect/>
+          <a:stretch>
+            <a:fillRect/>
+          </a:stretch>
+        </p:blipFill>
+        <p:spPr bwMode="auto">
+          <a:xfrm rot="10800000">
+            <a:off x="4590628" y="4077071"/>
             <a:ext cx="3707519" cy="2520280"/>
           </a:xfrm>
           <a:prstGeom prst="rect">
@@ -3162,6 +4361,13 @@
   <p:clrMapOvr>
     <a:masterClrMapping/>
   </p:clrMapOvr>
+  <p:timing>
+    <p:tnLst>
+      <p:par>
+        <p:cTn id="1" dur="indefinite" restart="never" nodeType="tmRoot"/>
+      </p:par>
+    </p:tnLst>
+  </p:timing>
 </p:sld>
 </file>
 

</xml_diff>

<commit_message>
Worked on the chapter on scalable architecture.
</commit_message>
<xml_diff>
--- a/material/figures/2-qubit-processor/processor photos.pptx
+++ b/material/figures/2-qubit-processor/processor photos.pptx
@@ -7,6 +7,7 @@
   <p:sldIdLst>
     <p:sldId id="256" r:id="rId2"/>
     <p:sldId id="257" r:id="rId3"/>
+    <p:sldId id="258" r:id="rId4"/>
   </p:sldIdLst>
   <p:sldSz cx="9144000" cy="6858000" type="screen4x3"/>
   <p:notesSz cx="6858000" cy="9144000"/>
@@ -290,7 +291,7 @@
             <a:fld id="{7CBDB685-D201-4371-8936-3DCA4D4F9BC3}" type="datetimeFigureOut">
               <a:rPr lang="de-DE" smtClean="0"/>
               <a:pPr/>
-              <a:t>29.08.2012</a:t>
+              <a:t>07.09.2012</a:t>
             </a:fld>
             <a:endParaRPr lang="de-DE"/>
           </a:p>
@@ -457,7 +458,7 @@
             <a:fld id="{7CBDB685-D201-4371-8936-3DCA4D4F9BC3}" type="datetimeFigureOut">
               <a:rPr lang="de-DE" smtClean="0"/>
               <a:pPr/>
-              <a:t>29.08.2012</a:t>
+              <a:t>07.09.2012</a:t>
             </a:fld>
             <a:endParaRPr lang="de-DE"/>
           </a:p>
@@ -634,7 +635,7 @@
             <a:fld id="{7CBDB685-D201-4371-8936-3DCA4D4F9BC3}" type="datetimeFigureOut">
               <a:rPr lang="de-DE" smtClean="0"/>
               <a:pPr/>
-              <a:t>29.08.2012</a:t>
+              <a:t>07.09.2012</a:t>
             </a:fld>
             <a:endParaRPr lang="de-DE"/>
           </a:p>
@@ -801,7 +802,7 @@
             <a:fld id="{7CBDB685-D201-4371-8936-3DCA4D4F9BC3}" type="datetimeFigureOut">
               <a:rPr lang="de-DE" smtClean="0"/>
               <a:pPr/>
-              <a:t>29.08.2012</a:t>
+              <a:t>07.09.2012</a:t>
             </a:fld>
             <a:endParaRPr lang="de-DE"/>
           </a:p>
@@ -1044,7 +1045,7 @@
             <a:fld id="{7CBDB685-D201-4371-8936-3DCA4D4F9BC3}" type="datetimeFigureOut">
               <a:rPr lang="de-DE" smtClean="0"/>
               <a:pPr/>
-              <a:t>29.08.2012</a:t>
+              <a:t>07.09.2012</a:t>
             </a:fld>
             <a:endParaRPr lang="de-DE"/>
           </a:p>
@@ -1329,7 +1330,7 @@
             <a:fld id="{7CBDB685-D201-4371-8936-3DCA4D4F9BC3}" type="datetimeFigureOut">
               <a:rPr lang="de-DE" smtClean="0"/>
               <a:pPr/>
-              <a:t>29.08.2012</a:t>
+              <a:t>07.09.2012</a:t>
             </a:fld>
             <a:endParaRPr lang="de-DE"/>
           </a:p>
@@ -1748,7 +1749,7 @@
             <a:fld id="{7CBDB685-D201-4371-8936-3DCA4D4F9BC3}" type="datetimeFigureOut">
               <a:rPr lang="de-DE" smtClean="0"/>
               <a:pPr/>
-              <a:t>29.08.2012</a:t>
+              <a:t>07.09.2012</a:t>
             </a:fld>
             <a:endParaRPr lang="de-DE"/>
           </a:p>
@@ -1863,7 +1864,7 @@
             <a:fld id="{7CBDB685-D201-4371-8936-3DCA4D4F9BC3}" type="datetimeFigureOut">
               <a:rPr lang="de-DE" smtClean="0"/>
               <a:pPr/>
-              <a:t>29.08.2012</a:t>
+              <a:t>07.09.2012</a:t>
             </a:fld>
             <a:endParaRPr lang="de-DE"/>
           </a:p>
@@ -1955,7 +1956,7 @@
             <a:fld id="{7CBDB685-D201-4371-8936-3DCA4D4F9BC3}" type="datetimeFigureOut">
               <a:rPr lang="de-DE" smtClean="0"/>
               <a:pPr/>
-              <a:t>29.08.2012</a:t>
+              <a:t>07.09.2012</a:t>
             </a:fld>
             <a:endParaRPr lang="de-DE"/>
           </a:p>
@@ -2229,7 +2230,7 @@
             <a:fld id="{7CBDB685-D201-4371-8936-3DCA4D4F9BC3}" type="datetimeFigureOut">
               <a:rPr lang="de-DE" smtClean="0"/>
               <a:pPr/>
-              <a:t>29.08.2012</a:t>
+              <a:t>07.09.2012</a:t>
             </a:fld>
             <a:endParaRPr lang="de-DE"/>
           </a:p>
@@ -2479,7 +2480,7 @@
             <a:fld id="{7CBDB685-D201-4371-8936-3DCA4D4F9BC3}" type="datetimeFigureOut">
               <a:rPr lang="de-DE" smtClean="0"/>
               <a:pPr/>
-              <a:t>29.08.2012</a:t>
+              <a:t>07.09.2012</a:t>
             </a:fld>
             <a:endParaRPr lang="de-DE"/>
           </a:p>
@@ -2689,7 +2690,7 @@
             <a:fld id="{7CBDB685-D201-4371-8936-3DCA4D4F9BC3}" type="datetimeFigureOut">
               <a:rPr lang="de-DE" smtClean="0"/>
               <a:pPr/>
-              <a:t>29.08.2012</a:t>
+              <a:t>07.09.2012</a:t>
             </a:fld>
             <a:endParaRPr lang="de-DE"/>
           </a:p>
@@ -4662,11 +4663,7 @@
           <a:p>
             <a:r>
               <a:rPr lang="de-DE" dirty="0" smtClean="0"/>
-              <a:t>b</a:t>
-            </a:r>
-            <a:r>
-              <a:rPr lang="de-DE" dirty="0" smtClean="0"/>
-              <a:t>)</a:t>
+              <a:t>b)</a:t>
             </a:r>
             <a:endParaRPr lang="de-DE" dirty="0"/>
           </a:p>
@@ -4698,11 +4695,7 @@
           <a:p>
             <a:r>
               <a:rPr lang="de-DE" dirty="0" smtClean="0"/>
-              <a:t>c</a:t>
-            </a:r>
-            <a:r>
-              <a:rPr lang="de-DE" dirty="0" smtClean="0"/>
-              <a:t>)</a:t>
+              <a:t>c)</a:t>
             </a:r>
             <a:endParaRPr lang="de-DE" dirty="0"/>
           </a:p>
@@ -4734,11 +4727,7 @@
           <a:p>
             <a:r>
               <a:rPr lang="de-DE" dirty="0" smtClean="0"/>
-              <a:t>d</a:t>
-            </a:r>
-            <a:r>
-              <a:rPr lang="de-DE" dirty="0" smtClean="0"/>
-              <a:t>)</a:t>
+              <a:t>d)</a:t>
             </a:r>
             <a:endParaRPr lang="de-DE" dirty="0"/>
           </a:p>
@@ -4770,13 +4759,665 @@
           <a:p>
             <a:r>
               <a:rPr lang="de-DE" dirty="0" smtClean="0"/>
+              <a:t>e)</a:t>
+            </a:r>
+            <a:endParaRPr lang="de-DE" dirty="0"/>
+          </a:p>
+        </p:txBody>
+      </p:sp>
+    </p:spTree>
+  </p:cSld>
+  <p:clrMapOvr>
+    <a:masterClrMapping/>
+  </p:clrMapOvr>
+  <p:timing>
+    <p:tnLst>
+      <p:par>
+        <p:cTn id="1" dur="indefinite" restart="never" nodeType="tmRoot"/>
+      </p:par>
+    </p:tnLst>
+  </p:timing>
+</p:sld>
+</file>
+
+<file path=ppt/slides/slide3.xml><?xml version="1.0" encoding="utf-8"?>
+<p:sld xmlns:a="http://schemas.openxmlformats.org/drawingml/2006/main" xmlns:r="http://schemas.openxmlformats.org/officeDocument/2006/relationships" xmlns:p="http://schemas.openxmlformats.org/presentationml/2006/main">
+  <p:cSld>
+    <p:spTree>
+      <p:nvGrpSpPr>
+        <p:cNvPr id="1" name=""/>
+        <p:cNvGrpSpPr/>
+        <p:nvPr/>
+      </p:nvGrpSpPr>
+      <p:grpSpPr>
+        <a:xfrm>
+          <a:off x="0" y="0"/>
+          <a:ext cx="0" cy="0"/>
+          <a:chOff x="0" y="0"/>
+          <a:chExt cx="0" cy="0"/>
+        </a:xfrm>
+      </p:grpSpPr>
+      <p:sp>
+        <p:nvSpPr>
+          <p:cNvPr id="11" name="Textfeld 10"/>
+          <p:cNvSpPr txBox="1"/>
+          <p:nvPr/>
+        </p:nvSpPr>
+        <p:spPr>
+          <a:xfrm>
+            <a:off x="755576" y="188640"/>
+            <a:ext cx="365806" cy="369332"/>
+          </a:xfrm>
+          <a:prstGeom prst="rect">
+            <a:avLst/>
+          </a:prstGeom>
+          <a:solidFill>
+            <a:schemeClr val="bg1"/>
+          </a:solidFill>
+        </p:spPr>
+        <p:txBody>
+          <a:bodyPr wrap="none" rtlCol="0">
+            <a:spAutoFit/>
+          </a:bodyPr>
+          <a:lstStyle/>
+          <a:p>
+            <a:r>
+              <a:rPr lang="de-DE" dirty="0" smtClean="0"/>
+              <a:t>a)</a:t>
+            </a:r>
+            <a:endParaRPr lang="de-DE" dirty="0"/>
+          </a:p>
+        </p:txBody>
+      </p:sp>
+      <p:grpSp>
+        <p:nvGrpSpPr>
+          <p:cNvPr id="21" name="Gruppieren 20"/>
+          <p:cNvGrpSpPr>
+            <a:grpSpLocks noChangeAspect="1"/>
+          </p:cNvGrpSpPr>
+          <p:nvPr/>
+        </p:nvGrpSpPr>
+        <p:grpSpPr>
+          <a:xfrm>
+            <a:off x="850938" y="260648"/>
+            <a:ext cx="7247508" cy="2016224"/>
+            <a:chOff x="-684584" y="2564904"/>
+            <a:chExt cx="9577064" cy="2664296"/>
+          </a:xfrm>
+        </p:grpSpPr>
+        <p:pic>
+          <p:nvPicPr>
+            <p:cNvPr id="19" name="Grafik 18" descr="DET13.TIF"/>
+            <p:cNvPicPr>
+              <a:picLocks noChangeAspect="1"/>
+            </p:cNvPicPr>
+            <p:nvPr/>
+          </p:nvPicPr>
+          <p:blipFill>
+            <a:blip r:embed="rId2" cstate="print">
+              <a:lum bright="14000" contrast="-9000"/>
+            </a:blip>
+            <a:srcRect t="3896" r="19835" b="5326"/>
+            <a:stretch>
+              <a:fillRect/>
+            </a:stretch>
+          </p:blipFill>
+          <p:spPr>
+            <a:xfrm>
+              <a:off x="5754355" y="2564904"/>
+              <a:ext cx="3138125" cy="2664296"/>
+            </a:xfrm>
+            <a:prstGeom prst="rect">
+              <a:avLst/>
+            </a:prstGeom>
+          </p:spPr>
+        </p:pic>
+        <p:pic>
+          <p:nvPicPr>
+            <p:cNvPr id="20" name="Grafik 19" descr="DET14.TIF"/>
+            <p:cNvPicPr>
+              <a:picLocks noChangeAspect="1"/>
+            </p:cNvPicPr>
+            <p:nvPr/>
+          </p:nvPicPr>
+          <p:blipFill>
+            <a:blip r:embed="rId3" cstate="print">
+              <a:lum bright="3000"/>
+            </a:blip>
+            <a:srcRect t="2047" b="5443"/>
+            <a:stretch>
+              <a:fillRect/>
+            </a:stretch>
+          </p:blipFill>
+          <p:spPr>
+            <a:xfrm>
+              <a:off x="2217497" y="2564904"/>
+              <a:ext cx="3841270" cy="2664296"/>
+            </a:xfrm>
+            <a:prstGeom prst="rect">
+              <a:avLst/>
+            </a:prstGeom>
+          </p:spPr>
+        </p:pic>
+        <p:pic>
+          <p:nvPicPr>
+            <p:cNvPr id="18" name="Grafik 17" descr="DET15.TIF"/>
+            <p:cNvPicPr>
+              <a:picLocks noChangeAspect="1"/>
+            </p:cNvPicPr>
+            <p:nvPr/>
+          </p:nvPicPr>
+          <p:blipFill>
+            <a:blip r:embed="rId4" cstate="print">
+              <a:lum bright="-7000" contrast="4000"/>
+            </a:blip>
+            <a:srcRect l="7263" t="2489" b="5001"/>
+            <a:stretch>
+              <a:fillRect/>
+            </a:stretch>
+          </p:blipFill>
+          <p:spPr>
+            <a:xfrm>
+              <a:off x="-684584" y="2564904"/>
+              <a:ext cx="3562260" cy="2664296"/>
+            </a:xfrm>
+            <a:prstGeom prst="rect">
+              <a:avLst/>
+            </a:prstGeom>
+          </p:spPr>
+        </p:pic>
+      </p:grpSp>
+      <p:pic>
+        <p:nvPicPr>
+          <p:cNvPr id="22" name="Grafik 21" descr="DET2.TIF"/>
+          <p:cNvPicPr>
+            <a:picLocks noChangeAspect="1"/>
+          </p:cNvPicPr>
+          <p:nvPr/>
+        </p:nvPicPr>
+        <p:blipFill>
+          <a:blip r:embed="rId5" cstate="print"/>
+          <a:stretch>
+            <a:fillRect/>
+          </a:stretch>
+        </p:blipFill>
+        <p:spPr>
+          <a:xfrm>
+            <a:off x="852985" y="2348879"/>
+            <a:ext cx="3600400" cy="2699407"/>
+          </a:xfrm>
+          <a:prstGeom prst="rect">
+            <a:avLst/>
+          </a:prstGeom>
+        </p:spPr>
+      </p:pic>
+      <p:pic>
+        <p:nvPicPr>
+          <p:cNvPr id="23" name="Grafik 22" descr="DET3.TIF"/>
+          <p:cNvPicPr>
+            <a:picLocks noChangeAspect="1"/>
+          </p:cNvPicPr>
+          <p:nvPr/>
+        </p:nvPicPr>
+        <p:blipFill>
+          <a:blip r:embed="rId6" cstate="print"/>
+          <a:stretch>
+            <a:fillRect/>
+          </a:stretch>
+        </p:blipFill>
+        <p:spPr>
+          <a:xfrm>
+            <a:off x="4499992" y="2348879"/>
+            <a:ext cx="3600400" cy="2699407"/>
+          </a:xfrm>
+          <a:prstGeom prst="rect">
+            <a:avLst/>
+          </a:prstGeom>
+        </p:spPr>
+      </p:pic>
+      <p:pic>
+        <p:nvPicPr>
+          <p:cNvPr id="24" name="Grafik 23" descr="DET4.TIF"/>
+          <p:cNvPicPr>
+            <a:picLocks noChangeAspect="1"/>
+          </p:cNvPicPr>
+          <p:nvPr/>
+        </p:nvPicPr>
+        <p:blipFill>
+          <a:blip r:embed="rId7" cstate="print"/>
+          <a:srcRect l="15878" r="10020"/>
+          <a:stretch>
+            <a:fillRect/>
+          </a:stretch>
+        </p:blipFill>
+        <p:spPr>
+          <a:xfrm>
+            <a:off x="852985" y="5085184"/>
+            <a:ext cx="1423226" cy="1440000"/>
+          </a:xfrm>
+          <a:prstGeom prst="rect">
+            <a:avLst/>
+          </a:prstGeom>
+        </p:spPr>
+      </p:pic>
+      <p:pic>
+        <p:nvPicPr>
+          <p:cNvPr id="25" name="Grafik 24" descr="DET8.TIF"/>
+          <p:cNvPicPr>
+            <a:picLocks noChangeAspect="1"/>
+          </p:cNvPicPr>
+          <p:nvPr/>
+        </p:nvPicPr>
+        <p:blipFill>
+          <a:blip r:embed="rId8" cstate="print">
+            <a:lum bright="-10000" contrast="40000"/>
+          </a:blip>
+          <a:stretch>
+            <a:fillRect/>
+          </a:stretch>
+        </p:blipFill>
+        <p:spPr>
+          <a:xfrm>
+            <a:off x="2318546" y="5085184"/>
+            <a:ext cx="1920635" cy="1440000"/>
+          </a:xfrm>
+          <a:prstGeom prst="rect">
+            <a:avLst/>
+          </a:prstGeom>
+        </p:spPr>
+      </p:pic>
+      <p:pic>
+        <p:nvPicPr>
+          <p:cNvPr id="26" name="Grafik 25" descr="DET11.TIF"/>
+          <p:cNvPicPr>
+            <a:picLocks noChangeAspect="1"/>
+          </p:cNvPicPr>
+          <p:nvPr/>
+        </p:nvPicPr>
+        <p:blipFill>
+          <a:blip r:embed="rId9" cstate="print">
+            <a:lum contrast="40000"/>
+          </a:blip>
+          <a:stretch>
+            <a:fillRect/>
+          </a:stretch>
+        </p:blipFill>
+        <p:spPr>
+          <a:xfrm>
+            <a:off x="4277876" y="5085184"/>
+            <a:ext cx="1920635" cy="1440000"/>
+          </a:xfrm>
+          <a:prstGeom prst="rect">
+            <a:avLst/>
+          </a:prstGeom>
+        </p:spPr>
+      </p:pic>
+      <p:pic>
+        <p:nvPicPr>
+          <p:cNvPr id="27" name="Grafik 26" descr="DET12.TIF"/>
+          <p:cNvPicPr>
+            <a:picLocks noChangeAspect="1"/>
+          </p:cNvPicPr>
+          <p:nvPr/>
+        </p:nvPicPr>
+        <p:blipFill>
+          <a:blip r:embed="rId10" cstate="print"/>
+          <a:srcRect r="2521"/>
+          <a:stretch>
+            <a:fillRect/>
+          </a:stretch>
+        </p:blipFill>
+        <p:spPr>
+          <a:xfrm>
+            <a:off x="6228184" y="5085184"/>
+            <a:ext cx="1872208" cy="1440000"/>
+          </a:xfrm>
+          <a:prstGeom prst="rect">
+            <a:avLst/>
+          </a:prstGeom>
+        </p:spPr>
+      </p:pic>
+      <p:sp>
+        <p:nvSpPr>
+          <p:cNvPr id="28" name="Textfeld 27"/>
+          <p:cNvSpPr txBox="1"/>
+          <p:nvPr/>
+        </p:nvSpPr>
+        <p:spPr>
+          <a:xfrm>
+            <a:off x="857257" y="260648"/>
+            <a:ext cx="389850" cy="369332"/>
+          </a:xfrm>
+          <a:prstGeom prst="rect">
+            <a:avLst/>
+          </a:prstGeom>
+          <a:solidFill>
+            <a:schemeClr val="bg1">
+              <a:lumMod val="50000"/>
+              <a:alpha val="53000"/>
+            </a:schemeClr>
+          </a:solidFill>
+        </p:spPr>
+        <p:txBody>
+          <a:bodyPr wrap="none" rtlCol="0">
+            <a:spAutoFit/>
+          </a:bodyPr>
+          <a:lstStyle/>
+          <a:p>
+            <a:r>
+              <a:rPr lang="de-DE" dirty="0" smtClean="0">
+                <a:solidFill>
+                  <a:schemeClr val="bg1"/>
+                </a:solidFill>
+                <a:latin typeface="Arial" pitchFamily="34" charset="0"/>
+                <a:cs typeface="Arial" pitchFamily="34" charset="0"/>
+              </a:rPr>
+              <a:t>a)</a:t>
+            </a:r>
+            <a:endParaRPr lang="de-DE" dirty="0">
+              <a:solidFill>
+                <a:schemeClr val="bg1"/>
+              </a:solidFill>
+              <a:latin typeface="Arial" pitchFamily="34" charset="0"/>
+              <a:cs typeface="Arial" pitchFamily="34" charset="0"/>
+            </a:endParaRPr>
+          </a:p>
+        </p:txBody>
+      </p:sp>
+      <p:sp>
+        <p:nvSpPr>
+          <p:cNvPr id="29" name="Textfeld 28"/>
+          <p:cNvSpPr txBox="1"/>
+          <p:nvPr/>
+        </p:nvSpPr>
+        <p:spPr>
+          <a:xfrm>
+            <a:off x="852985" y="2348880"/>
+            <a:ext cx="389850" cy="369332"/>
+          </a:xfrm>
+          <a:prstGeom prst="rect">
+            <a:avLst/>
+          </a:prstGeom>
+          <a:noFill/>
+        </p:spPr>
+        <p:txBody>
+          <a:bodyPr wrap="none" rtlCol="0">
+            <a:spAutoFit/>
+          </a:bodyPr>
+          <a:lstStyle/>
+          <a:p>
+            <a:r>
+              <a:rPr lang="de-DE" dirty="0" smtClean="0">
+                <a:solidFill>
+                  <a:schemeClr val="bg1"/>
+                </a:solidFill>
+                <a:latin typeface="Arial" pitchFamily="34" charset="0"/>
+                <a:cs typeface="Arial" pitchFamily="34" charset="0"/>
+              </a:rPr>
+              <a:t>b</a:t>
+            </a:r>
+            <a:r>
+              <a:rPr lang="de-DE" dirty="0" smtClean="0">
+                <a:solidFill>
+                  <a:schemeClr val="bg1"/>
+                </a:solidFill>
+                <a:latin typeface="Arial" pitchFamily="34" charset="0"/>
+                <a:cs typeface="Arial" pitchFamily="34" charset="0"/>
+              </a:rPr>
+              <a:t>)</a:t>
+            </a:r>
+            <a:endParaRPr lang="de-DE" dirty="0">
+              <a:solidFill>
+                <a:schemeClr val="bg1"/>
+              </a:solidFill>
+              <a:latin typeface="Arial" pitchFamily="34" charset="0"/>
+              <a:cs typeface="Arial" pitchFamily="34" charset="0"/>
+            </a:endParaRPr>
+          </a:p>
+        </p:txBody>
+      </p:sp>
+      <p:sp>
+        <p:nvSpPr>
+          <p:cNvPr id="30" name="Textfeld 29"/>
+          <p:cNvSpPr txBox="1"/>
+          <p:nvPr/>
+        </p:nvSpPr>
+        <p:spPr>
+          <a:xfrm>
+            <a:off x="4499992" y="2348880"/>
+            <a:ext cx="377026" cy="369332"/>
+          </a:xfrm>
+          <a:prstGeom prst="rect">
+            <a:avLst/>
+          </a:prstGeom>
+          <a:noFill/>
+        </p:spPr>
+        <p:txBody>
+          <a:bodyPr wrap="none" rtlCol="0">
+            <a:spAutoFit/>
+          </a:bodyPr>
+          <a:lstStyle/>
+          <a:p>
+            <a:r>
+              <a:rPr lang="de-DE" dirty="0" smtClean="0">
+                <a:solidFill>
+                  <a:schemeClr val="bg1"/>
+                </a:solidFill>
+                <a:latin typeface="Arial" pitchFamily="34" charset="0"/>
+                <a:cs typeface="Arial" pitchFamily="34" charset="0"/>
+              </a:rPr>
+              <a:t>c</a:t>
+            </a:r>
+            <a:r>
+              <a:rPr lang="de-DE" dirty="0" smtClean="0">
+                <a:solidFill>
+                  <a:schemeClr val="bg1"/>
+                </a:solidFill>
+                <a:latin typeface="Arial" pitchFamily="34" charset="0"/>
+                <a:cs typeface="Arial" pitchFamily="34" charset="0"/>
+              </a:rPr>
+              <a:t>)</a:t>
+            </a:r>
+            <a:endParaRPr lang="de-DE" dirty="0">
+              <a:solidFill>
+                <a:schemeClr val="bg1"/>
+              </a:solidFill>
+              <a:latin typeface="Arial" pitchFamily="34" charset="0"/>
+              <a:cs typeface="Arial" pitchFamily="34" charset="0"/>
+            </a:endParaRPr>
+          </a:p>
+        </p:txBody>
+      </p:sp>
+      <p:sp>
+        <p:nvSpPr>
+          <p:cNvPr id="31" name="Textfeld 30"/>
+          <p:cNvSpPr txBox="1"/>
+          <p:nvPr/>
+        </p:nvSpPr>
+        <p:spPr>
+          <a:xfrm>
+            <a:off x="827584" y="5085184"/>
+            <a:ext cx="389850" cy="369332"/>
+          </a:xfrm>
+          <a:prstGeom prst="rect">
+            <a:avLst/>
+          </a:prstGeom>
+          <a:noFill/>
+        </p:spPr>
+        <p:txBody>
+          <a:bodyPr wrap="none" rtlCol="0">
+            <a:spAutoFit/>
+          </a:bodyPr>
+          <a:lstStyle/>
+          <a:p>
+            <a:r>
+              <a:rPr lang="de-DE" dirty="0" smtClean="0">
+                <a:solidFill>
+                  <a:schemeClr val="bg1"/>
+                </a:solidFill>
+                <a:latin typeface="Arial" pitchFamily="34" charset="0"/>
+                <a:cs typeface="Arial" pitchFamily="34" charset="0"/>
+              </a:rPr>
+              <a:t>d)</a:t>
+            </a:r>
+            <a:endParaRPr lang="de-DE" dirty="0">
+              <a:solidFill>
+                <a:schemeClr val="bg1"/>
+              </a:solidFill>
+              <a:latin typeface="Arial" pitchFamily="34" charset="0"/>
+              <a:cs typeface="Arial" pitchFamily="34" charset="0"/>
+            </a:endParaRPr>
+          </a:p>
+        </p:txBody>
+      </p:sp>
+      <p:sp>
+        <p:nvSpPr>
+          <p:cNvPr id="32" name="Textfeld 31"/>
+          <p:cNvSpPr txBox="1"/>
+          <p:nvPr/>
+        </p:nvSpPr>
+        <p:spPr>
+          <a:xfrm>
+            <a:off x="2322818" y="5085184"/>
+            <a:ext cx="389850" cy="369332"/>
+          </a:xfrm>
+          <a:prstGeom prst="rect">
+            <a:avLst/>
+          </a:prstGeom>
+          <a:noFill/>
+        </p:spPr>
+        <p:txBody>
+          <a:bodyPr wrap="none" rtlCol="0">
+            <a:spAutoFit/>
+          </a:bodyPr>
+          <a:lstStyle/>
+          <a:p>
+            <a:r>
+              <a:rPr lang="de-DE" dirty="0" smtClean="0">
+                <a:solidFill>
+                  <a:schemeClr val="bg1"/>
+                </a:solidFill>
+                <a:latin typeface="Arial" pitchFamily="34" charset="0"/>
+                <a:cs typeface="Arial" pitchFamily="34" charset="0"/>
+              </a:rPr>
               <a:t>e</a:t>
             </a:r>
             <a:r>
-              <a:rPr lang="de-DE" dirty="0" smtClean="0"/>
+              <a:rPr lang="de-DE" dirty="0" smtClean="0">
+                <a:solidFill>
+                  <a:schemeClr val="bg1"/>
+                </a:solidFill>
+                <a:latin typeface="Arial" pitchFamily="34" charset="0"/>
+                <a:cs typeface="Arial" pitchFamily="34" charset="0"/>
+              </a:rPr>
               <a:t>)</a:t>
             </a:r>
-            <a:endParaRPr lang="de-DE" dirty="0"/>
+            <a:endParaRPr lang="de-DE" dirty="0">
+              <a:solidFill>
+                <a:schemeClr val="bg1"/>
+              </a:solidFill>
+              <a:latin typeface="Arial" pitchFamily="34" charset="0"/>
+              <a:cs typeface="Arial" pitchFamily="34" charset="0"/>
+            </a:endParaRPr>
+          </a:p>
+        </p:txBody>
+      </p:sp>
+      <p:sp>
+        <p:nvSpPr>
+          <p:cNvPr id="35" name="Textfeld 34"/>
+          <p:cNvSpPr txBox="1"/>
+          <p:nvPr/>
+        </p:nvSpPr>
+        <p:spPr>
+          <a:xfrm>
+            <a:off x="4283968" y="5085184"/>
+            <a:ext cx="325730" cy="369332"/>
+          </a:xfrm>
+          <a:prstGeom prst="rect">
+            <a:avLst/>
+          </a:prstGeom>
+          <a:noFill/>
+        </p:spPr>
+        <p:txBody>
+          <a:bodyPr wrap="none" rtlCol="0">
+            <a:spAutoFit/>
+          </a:bodyPr>
+          <a:lstStyle/>
+          <a:p>
+            <a:r>
+              <a:rPr lang="de-DE" dirty="0" smtClean="0">
+                <a:solidFill>
+                  <a:schemeClr val="bg1"/>
+                </a:solidFill>
+                <a:latin typeface="Arial" pitchFamily="34" charset="0"/>
+                <a:cs typeface="Arial" pitchFamily="34" charset="0"/>
+              </a:rPr>
+              <a:t>f)</a:t>
+            </a:r>
+            <a:endParaRPr lang="de-DE" dirty="0">
+              <a:solidFill>
+                <a:schemeClr val="bg1"/>
+              </a:solidFill>
+              <a:latin typeface="Arial" pitchFamily="34" charset="0"/>
+              <a:cs typeface="Arial" pitchFamily="34" charset="0"/>
+            </a:endParaRPr>
+          </a:p>
+        </p:txBody>
+      </p:sp>
+      <p:sp>
+        <p:nvSpPr>
+          <p:cNvPr id="36" name="Textfeld 35"/>
+          <p:cNvSpPr txBox="1"/>
+          <p:nvPr/>
+        </p:nvSpPr>
+        <p:spPr>
+          <a:xfrm>
+            <a:off x="6228184" y="5085184"/>
+            <a:ext cx="389850" cy="369332"/>
+          </a:xfrm>
+          <a:prstGeom prst="rect">
+            <a:avLst/>
+          </a:prstGeom>
+          <a:solidFill>
+            <a:schemeClr val="bg1">
+              <a:lumMod val="50000"/>
+              <a:alpha val="43000"/>
+            </a:schemeClr>
+          </a:solidFill>
+        </p:spPr>
+        <p:txBody>
+          <a:bodyPr wrap="none" rtlCol="0">
+            <a:spAutoFit/>
+          </a:bodyPr>
+          <a:lstStyle/>
+          <a:p>
+            <a:r>
+              <a:rPr lang="de-DE" dirty="0" smtClean="0">
+                <a:solidFill>
+                  <a:schemeClr val="bg1"/>
+                </a:solidFill>
+                <a:latin typeface="Arial" pitchFamily="34" charset="0"/>
+                <a:cs typeface="Arial" pitchFamily="34" charset="0"/>
+              </a:rPr>
+              <a:t>g</a:t>
+            </a:r>
+            <a:r>
+              <a:rPr lang="de-DE" dirty="0" smtClean="0">
+                <a:solidFill>
+                  <a:schemeClr val="bg1"/>
+                </a:solidFill>
+                <a:latin typeface="Arial" pitchFamily="34" charset="0"/>
+                <a:cs typeface="Arial" pitchFamily="34" charset="0"/>
+              </a:rPr>
+              <a:t>)</a:t>
+            </a:r>
+            <a:endParaRPr lang="de-DE" dirty="0">
+              <a:solidFill>
+                <a:schemeClr val="bg1"/>
+              </a:solidFill>
+              <a:latin typeface="Arial" pitchFamily="34" charset="0"/>
+              <a:cs typeface="Arial" pitchFamily="34" charset="0"/>
+            </a:endParaRPr>
           </a:p>
         </p:txBody>
       </p:sp>

</xml_diff>

<commit_message>
Worked on all sections.
</commit_message>
<xml_diff>
--- a/material/figures/2-qubit-processor/processor photos.pptx
+++ b/material/figures/2-qubit-processor/processor photos.pptx
@@ -291,7 +291,7 @@
             <a:fld id="{7CBDB685-D201-4371-8936-3DCA4D4F9BC3}" type="datetimeFigureOut">
               <a:rPr lang="de-DE" smtClean="0"/>
               <a:pPr/>
-              <a:t>07.09.2012</a:t>
+              <a:t>25.09.2012</a:t>
             </a:fld>
             <a:endParaRPr lang="de-DE"/>
           </a:p>
@@ -458,7 +458,7 @@
             <a:fld id="{7CBDB685-D201-4371-8936-3DCA4D4F9BC3}" type="datetimeFigureOut">
               <a:rPr lang="de-DE" smtClean="0"/>
               <a:pPr/>
-              <a:t>07.09.2012</a:t>
+              <a:t>25.09.2012</a:t>
             </a:fld>
             <a:endParaRPr lang="de-DE"/>
           </a:p>
@@ -635,7 +635,7 @@
             <a:fld id="{7CBDB685-D201-4371-8936-3DCA4D4F9BC3}" type="datetimeFigureOut">
               <a:rPr lang="de-DE" smtClean="0"/>
               <a:pPr/>
-              <a:t>07.09.2012</a:t>
+              <a:t>25.09.2012</a:t>
             </a:fld>
             <a:endParaRPr lang="de-DE"/>
           </a:p>
@@ -802,7 +802,7 @@
             <a:fld id="{7CBDB685-D201-4371-8936-3DCA4D4F9BC3}" type="datetimeFigureOut">
               <a:rPr lang="de-DE" smtClean="0"/>
               <a:pPr/>
-              <a:t>07.09.2012</a:t>
+              <a:t>25.09.2012</a:t>
             </a:fld>
             <a:endParaRPr lang="de-DE"/>
           </a:p>
@@ -1045,7 +1045,7 @@
             <a:fld id="{7CBDB685-D201-4371-8936-3DCA4D4F9BC3}" type="datetimeFigureOut">
               <a:rPr lang="de-DE" smtClean="0"/>
               <a:pPr/>
-              <a:t>07.09.2012</a:t>
+              <a:t>25.09.2012</a:t>
             </a:fld>
             <a:endParaRPr lang="de-DE"/>
           </a:p>
@@ -1330,7 +1330,7 @@
             <a:fld id="{7CBDB685-D201-4371-8936-3DCA4D4F9BC3}" type="datetimeFigureOut">
               <a:rPr lang="de-DE" smtClean="0"/>
               <a:pPr/>
-              <a:t>07.09.2012</a:t>
+              <a:t>25.09.2012</a:t>
             </a:fld>
             <a:endParaRPr lang="de-DE"/>
           </a:p>
@@ -1749,7 +1749,7 @@
             <a:fld id="{7CBDB685-D201-4371-8936-3DCA4D4F9BC3}" type="datetimeFigureOut">
               <a:rPr lang="de-DE" smtClean="0"/>
               <a:pPr/>
-              <a:t>07.09.2012</a:t>
+              <a:t>25.09.2012</a:t>
             </a:fld>
             <a:endParaRPr lang="de-DE"/>
           </a:p>
@@ -1864,7 +1864,7 @@
             <a:fld id="{7CBDB685-D201-4371-8936-3DCA4D4F9BC3}" type="datetimeFigureOut">
               <a:rPr lang="de-DE" smtClean="0"/>
               <a:pPr/>
-              <a:t>07.09.2012</a:t>
+              <a:t>25.09.2012</a:t>
             </a:fld>
             <a:endParaRPr lang="de-DE"/>
           </a:p>
@@ -1956,7 +1956,7 @@
             <a:fld id="{7CBDB685-D201-4371-8936-3DCA4D4F9BC3}" type="datetimeFigureOut">
               <a:rPr lang="de-DE" smtClean="0"/>
               <a:pPr/>
-              <a:t>07.09.2012</a:t>
+              <a:t>25.09.2012</a:t>
             </a:fld>
             <a:endParaRPr lang="de-DE"/>
           </a:p>
@@ -2230,7 +2230,7 @@
             <a:fld id="{7CBDB685-D201-4371-8936-3DCA4D4F9BC3}" type="datetimeFigureOut">
               <a:rPr lang="de-DE" smtClean="0"/>
               <a:pPr/>
-              <a:t>07.09.2012</a:t>
+              <a:t>25.09.2012</a:t>
             </a:fld>
             <a:endParaRPr lang="de-DE"/>
           </a:p>
@@ -2480,7 +2480,7 @@
             <a:fld id="{7CBDB685-D201-4371-8936-3DCA4D4F9BC3}" type="datetimeFigureOut">
               <a:rPr lang="de-DE" smtClean="0"/>
               <a:pPr/>
-              <a:t>07.09.2012</a:t>
+              <a:t>25.09.2012</a:t>
             </a:fld>
             <a:endParaRPr lang="de-DE"/>
           </a:p>
@@ -2690,7 +2690,7 @@
             <a:fld id="{7CBDB685-D201-4371-8936-3DCA4D4F9BC3}" type="datetimeFigureOut">
               <a:rPr lang="de-DE" smtClean="0"/>
               <a:pPr/>
-              <a:t>07.09.2012</a:t>
+              <a:t>25.09.2012</a:t>
             </a:fld>
             <a:endParaRPr lang="de-DE"/>
           </a:p>
@@ -4797,6 +4797,32 @@
           <a:chExt cx="0" cy="0"/>
         </a:xfrm>
       </p:grpSpPr>
+      <p:pic>
+        <p:nvPicPr>
+          <p:cNvPr id="34" name="Picture 3" descr="E:\cygwin\home\adewes\thesis\material_thesis\photos_chip\ct5\DET3_modified.tif"/>
+          <p:cNvPicPr>
+            <a:picLocks noChangeAspect="1" noChangeArrowheads="1"/>
+          </p:cNvPicPr>
+          <p:nvPr/>
+        </p:nvPicPr>
+        <p:blipFill>
+          <a:blip r:embed="rId2" cstate="print"/>
+          <a:srcRect r="9353"/>
+          <a:stretch>
+            <a:fillRect/>
+          </a:stretch>
+        </p:blipFill>
+        <p:spPr bwMode="auto">
+          <a:xfrm>
+            <a:off x="4499992" y="2348880"/>
+            <a:ext cx="3600400" cy="2700000"/>
+          </a:xfrm>
+          <a:prstGeom prst="rect">
+            <a:avLst/>
+          </a:prstGeom>
+          <a:noFill/>
+        </p:spPr>
+      </p:pic>
       <p:sp>
         <p:nvSpPr>
           <p:cNvPr id="11" name="Textfeld 10"/>
@@ -4854,7 +4880,7 @@
             <p:nvPr/>
           </p:nvPicPr>
           <p:blipFill>
-            <a:blip r:embed="rId2" cstate="print">
+            <a:blip r:embed="rId3" cstate="print">
               <a:lum bright="14000" contrast="-9000"/>
             </a:blip>
             <a:srcRect t="3896" r="19835" b="5326"/>
@@ -4881,7 +4907,7 @@
             <p:nvPr/>
           </p:nvPicPr>
           <p:blipFill>
-            <a:blip r:embed="rId3" cstate="print">
+            <a:blip r:embed="rId4" cstate="print">
               <a:lum bright="3000"/>
             </a:blip>
             <a:srcRect t="2047" b="5443"/>
@@ -4908,7 +4934,7 @@
             <p:nvPr/>
           </p:nvPicPr>
           <p:blipFill>
-            <a:blip r:embed="rId4" cstate="print">
+            <a:blip r:embed="rId5" cstate="print">
               <a:lum bright="-7000" contrast="4000"/>
             </a:blip>
             <a:srcRect l="7263" t="2489" b="5001"/>
@@ -4936,7 +4962,7 @@
           <p:nvPr/>
         </p:nvPicPr>
         <p:blipFill>
-          <a:blip r:embed="rId5" cstate="print"/>
+          <a:blip r:embed="rId6" cstate="print"/>
           <a:stretch>
             <a:fillRect/>
           </a:stretch>
@@ -4945,55 +4971,6 @@
           <a:xfrm>
             <a:off x="852985" y="2348879"/>
             <a:ext cx="3600400" cy="2699407"/>
-          </a:xfrm>
-          <a:prstGeom prst="rect">
-            <a:avLst/>
-          </a:prstGeom>
-        </p:spPr>
-      </p:pic>
-      <p:pic>
-        <p:nvPicPr>
-          <p:cNvPr id="23" name="Grafik 22" descr="DET3.TIF"/>
-          <p:cNvPicPr>
-            <a:picLocks noChangeAspect="1"/>
-          </p:cNvPicPr>
-          <p:nvPr/>
-        </p:nvPicPr>
-        <p:blipFill>
-          <a:blip r:embed="rId6" cstate="print"/>
-          <a:stretch>
-            <a:fillRect/>
-          </a:stretch>
-        </p:blipFill>
-        <p:spPr>
-          <a:xfrm>
-            <a:off x="4499992" y="2348879"/>
-            <a:ext cx="3600400" cy="2699407"/>
-          </a:xfrm>
-          <a:prstGeom prst="rect">
-            <a:avLst/>
-          </a:prstGeom>
-        </p:spPr>
-      </p:pic>
-      <p:pic>
-        <p:nvPicPr>
-          <p:cNvPr id="24" name="Grafik 23" descr="DET4.TIF"/>
-          <p:cNvPicPr>
-            <a:picLocks noChangeAspect="1"/>
-          </p:cNvPicPr>
-          <p:nvPr/>
-        </p:nvPicPr>
-        <p:blipFill>
-          <a:blip r:embed="rId7" cstate="print"/>
-          <a:srcRect l="15878" r="10020"/>
-          <a:stretch>
-            <a:fillRect/>
-          </a:stretch>
-        </p:blipFill>
-        <p:spPr>
-          <a:xfrm>
-            <a:off x="852985" y="5085184"/>
-            <a:ext cx="1423226" cy="1440000"/>
           </a:xfrm>
           <a:prstGeom prst="rect">
             <a:avLst/>
@@ -5009,7 +4986,7 @@
           <p:nvPr/>
         </p:nvPicPr>
         <p:blipFill>
-          <a:blip r:embed="rId8" cstate="print">
+          <a:blip r:embed="rId7" cstate="print">
             <a:lum bright="-10000" contrast="40000"/>
           </a:blip>
           <a:stretch>
@@ -5035,7 +5012,7 @@
           <p:nvPr/>
         </p:nvPicPr>
         <p:blipFill>
-          <a:blip r:embed="rId9" cstate="print">
+          <a:blip r:embed="rId8" cstate="print">
             <a:lum contrast="40000"/>
           </a:blip>
           <a:stretch>
@@ -5061,7 +5038,7 @@
           <p:nvPr/>
         </p:nvPicPr>
         <p:blipFill>
-          <a:blip r:embed="rId10" cstate="print"/>
+          <a:blip r:embed="rId9" cstate="print"/>
           <a:srcRect r="2521"/>
           <a:stretch>
             <a:fillRect/>
@@ -5154,8 +5131,40 @@
                 <a:latin typeface="Arial" pitchFamily="34" charset="0"/>
                 <a:cs typeface="Arial" pitchFamily="34" charset="0"/>
               </a:rPr>
-              <a:t>b</a:t>
-            </a:r>
+              <a:t>b)</a:t>
+            </a:r>
+            <a:endParaRPr lang="de-DE" dirty="0">
+              <a:solidFill>
+                <a:schemeClr val="bg1"/>
+              </a:solidFill>
+              <a:latin typeface="Arial" pitchFamily="34" charset="0"/>
+              <a:cs typeface="Arial" pitchFamily="34" charset="0"/>
+            </a:endParaRPr>
+          </a:p>
+        </p:txBody>
+      </p:sp>
+      <p:sp>
+        <p:nvSpPr>
+          <p:cNvPr id="30" name="Textfeld 29"/>
+          <p:cNvSpPr txBox="1"/>
+          <p:nvPr/>
+        </p:nvSpPr>
+        <p:spPr>
+          <a:xfrm>
+            <a:off x="4499992" y="2348880"/>
+            <a:ext cx="377026" cy="369332"/>
+          </a:xfrm>
+          <a:prstGeom prst="rect">
+            <a:avLst/>
+          </a:prstGeom>
+          <a:noFill/>
+        </p:spPr>
+        <p:txBody>
+          <a:bodyPr wrap="none" rtlCol="0">
+            <a:spAutoFit/>
+          </a:bodyPr>
+          <a:lstStyle/>
+          <a:p>
             <a:r>
               <a:rPr lang="de-DE" dirty="0" smtClean="0">
                 <a:solidFill>
@@ -5164,7 +5173,7 @@
                 <a:latin typeface="Arial" pitchFamily="34" charset="0"/>
                 <a:cs typeface="Arial" pitchFamily="34" charset="0"/>
               </a:rPr>
-              <a:t>)</a:t>
+              <a:t>c)</a:t>
             </a:r>
             <a:endParaRPr lang="de-DE" dirty="0">
               <a:solidFill>
@@ -5178,14 +5187,14 @@
       </p:sp>
       <p:sp>
         <p:nvSpPr>
-          <p:cNvPr id="30" name="Textfeld 29"/>
+          <p:cNvPr id="32" name="Textfeld 31"/>
           <p:cNvSpPr txBox="1"/>
           <p:nvPr/>
         </p:nvSpPr>
         <p:spPr>
           <a:xfrm>
-            <a:off x="4499992" y="2348880"/>
-            <a:ext cx="377026" cy="369332"/>
+            <a:off x="2322818" y="5085184"/>
+            <a:ext cx="389850" cy="369332"/>
           </a:xfrm>
           <a:prstGeom prst="rect">
             <a:avLst/>
@@ -5206,111 +5215,7 @@
                 <a:latin typeface="Arial" pitchFamily="34" charset="0"/>
                 <a:cs typeface="Arial" pitchFamily="34" charset="0"/>
               </a:rPr>
-              <a:t>c</a:t>
-            </a:r>
-            <a:r>
-              <a:rPr lang="de-DE" dirty="0" smtClean="0">
-                <a:solidFill>
-                  <a:schemeClr val="bg1"/>
-                </a:solidFill>
-                <a:latin typeface="Arial" pitchFamily="34" charset="0"/>
-                <a:cs typeface="Arial" pitchFamily="34" charset="0"/>
-              </a:rPr>
-              <a:t>)</a:t>
-            </a:r>
-            <a:endParaRPr lang="de-DE" dirty="0">
-              <a:solidFill>
-                <a:schemeClr val="bg1"/>
-              </a:solidFill>
-              <a:latin typeface="Arial" pitchFamily="34" charset="0"/>
-              <a:cs typeface="Arial" pitchFamily="34" charset="0"/>
-            </a:endParaRPr>
-          </a:p>
-        </p:txBody>
-      </p:sp>
-      <p:sp>
-        <p:nvSpPr>
-          <p:cNvPr id="31" name="Textfeld 30"/>
-          <p:cNvSpPr txBox="1"/>
-          <p:nvPr/>
-        </p:nvSpPr>
-        <p:spPr>
-          <a:xfrm>
-            <a:off x="827584" y="5085184"/>
-            <a:ext cx="389850" cy="369332"/>
-          </a:xfrm>
-          <a:prstGeom prst="rect">
-            <a:avLst/>
-          </a:prstGeom>
-          <a:noFill/>
-        </p:spPr>
-        <p:txBody>
-          <a:bodyPr wrap="none" rtlCol="0">
-            <a:spAutoFit/>
-          </a:bodyPr>
-          <a:lstStyle/>
-          <a:p>
-            <a:r>
-              <a:rPr lang="de-DE" dirty="0" smtClean="0">
-                <a:solidFill>
-                  <a:schemeClr val="bg1"/>
-                </a:solidFill>
-                <a:latin typeface="Arial" pitchFamily="34" charset="0"/>
-                <a:cs typeface="Arial" pitchFamily="34" charset="0"/>
-              </a:rPr>
-              <a:t>d)</a:t>
-            </a:r>
-            <a:endParaRPr lang="de-DE" dirty="0">
-              <a:solidFill>
-                <a:schemeClr val="bg1"/>
-              </a:solidFill>
-              <a:latin typeface="Arial" pitchFamily="34" charset="0"/>
-              <a:cs typeface="Arial" pitchFamily="34" charset="0"/>
-            </a:endParaRPr>
-          </a:p>
-        </p:txBody>
-      </p:sp>
-      <p:sp>
-        <p:nvSpPr>
-          <p:cNvPr id="32" name="Textfeld 31"/>
-          <p:cNvSpPr txBox="1"/>
-          <p:nvPr/>
-        </p:nvSpPr>
-        <p:spPr>
-          <a:xfrm>
-            <a:off x="2322818" y="5085184"/>
-            <a:ext cx="389850" cy="369332"/>
-          </a:xfrm>
-          <a:prstGeom prst="rect">
-            <a:avLst/>
-          </a:prstGeom>
-          <a:noFill/>
-        </p:spPr>
-        <p:txBody>
-          <a:bodyPr wrap="none" rtlCol="0">
-            <a:spAutoFit/>
-          </a:bodyPr>
-          <a:lstStyle/>
-          <a:p>
-            <a:r>
-              <a:rPr lang="de-DE" dirty="0" smtClean="0">
-                <a:solidFill>
-                  <a:schemeClr val="bg1"/>
-                </a:solidFill>
-                <a:latin typeface="Arial" pitchFamily="34" charset="0"/>
-                <a:cs typeface="Arial" pitchFamily="34" charset="0"/>
-              </a:rPr>
-              <a:t>e</a:t>
-            </a:r>
-            <a:r>
-              <a:rPr lang="de-DE" dirty="0" smtClean="0">
-                <a:solidFill>
-                  <a:schemeClr val="bg1"/>
-                </a:solidFill>
-                <a:latin typeface="Arial" pitchFamily="34" charset="0"/>
-                <a:cs typeface="Arial" pitchFamily="34" charset="0"/>
-              </a:rPr>
-              <a:t>)</a:t>
+              <a:t>e)</a:t>
             </a:r>
             <a:endParaRPr lang="de-DE" dirty="0">
               <a:solidFill>
@@ -5399,8 +5304,66 @@
                 <a:latin typeface="Arial" pitchFamily="34" charset="0"/>
                 <a:cs typeface="Arial" pitchFamily="34" charset="0"/>
               </a:rPr>
-              <a:t>g</a:t>
-            </a:r>
+              <a:t>g)</a:t>
+            </a:r>
+            <a:endParaRPr lang="de-DE" dirty="0">
+              <a:solidFill>
+                <a:schemeClr val="bg1"/>
+              </a:solidFill>
+              <a:latin typeface="Arial" pitchFamily="34" charset="0"/>
+              <a:cs typeface="Arial" pitchFamily="34" charset="0"/>
+            </a:endParaRPr>
+          </a:p>
+        </p:txBody>
+      </p:sp>
+      <p:pic>
+        <p:nvPicPr>
+          <p:cNvPr id="1026" name="Picture 2" descr="E:\cygwin\home\adewes\thesis\material_thesis\photos_chip\ct5\DET4.TIF"/>
+          <p:cNvPicPr>
+            <a:picLocks noChangeAspect="1" noChangeArrowheads="1"/>
+          </p:cNvPicPr>
+          <p:nvPr/>
+        </p:nvPicPr>
+        <p:blipFill>
+          <a:blip r:embed="rId10" cstate="print"/>
+          <a:srcRect l="27194" t="13335" r="22950" b="13324"/>
+          <a:stretch>
+            <a:fillRect/>
+          </a:stretch>
+        </p:blipFill>
+        <p:spPr bwMode="auto">
+          <a:xfrm>
+            <a:off x="852985" y="5093651"/>
+            <a:ext cx="1431693" cy="1431693"/>
+          </a:xfrm>
+          <a:prstGeom prst="rect">
+            <a:avLst/>
+          </a:prstGeom>
+          <a:noFill/>
+        </p:spPr>
+      </p:pic>
+      <p:sp>
+        <p:nvSpPr>
+          <p:cNvPr id="33" name="Textfeld 32"/>
+          <p:cNvSpPr txBox="1"/>
+          <p:nvPr/>
+        </p:nvSpPr>
+        <p:spPr>
+          <a:xfrm>
+            <a:off x="827584" y="5085184"/>
+            <a:ext cx="389850" cy="369332"/>
+          </a:xfrm>
+          <a:prstGeom prst="rect">
+            <a:avLst/>
+          </a:prstGeom>
+          <a:noFill/>
+        </p:spPr>
+        <p:txBody>
+          <a:bodyPr wrap="none" rtlCol="0">
+            <a:spAutoFit/>
+          </a:bodyPr>
+          <a:lstStyle/>
+          <a:p>
             <a:r>
               <a:rPr lang="de-DE" dirty="0" smtClean="0">
                 <a:solidFill>
@@ -5409,7 +5372,7 @@
                 <a:latin typeface="Arial" pitchFamily="34" charset="0"/>
                 <a:cs typeface="Arial" pitchFamily="34" charset="0"/>
               </a:rPr>
-              <a:t>)</a:t>
+              <a:t>d)</a:t>
             </a:r>
             <a:endParaRPr lang="de-DE" dirty="0">
               <a:solidFill>

</xml_diff>

<commit_message>
Added final version of thesis with all relevant files.
</commit_message>
<xml_diff>
--- a/material/figures/2-qubit-processor/processor photos.pptx
+++ b/material/figures/2-qubit-processor/processor photos.pptx
@@ -291,7 +291,7 @@
             <a:fld id="{7CBDB685-D201-4371-8936-3DCA4D4F9BC3}" type="datetimeFigureOut">
               <a:rPr lang="de-DE" smtClean="0"/>
               <a:pPr/>
-              <a:t>25.09.2012</a:t>
+              <a:t>16.10.2012</a:t>
             </a:fld>
             <a:endParaRPr lang="de-DE"/>
           </a:p>
@@ -458,7 +458,7 @@
             <a:fld id="{7CBDB685-D201-4371-8936-3DCA4D4F9BC3}" type="datetimeFigureOut">
               <a:rPr lang="de-DE" smtClean="0"/>
               <a:pPr/>
-              <a:t>25.09.2012</a:t>
+              <a:t>16.10.2012</a:t>
             </a:fld>
             <a:endParaRPr lang="de-DE"/>
           </a:p>
@@ -635,7 +635,7 @@
             <a:fld id="{7CBDB685-D201-4371-8936-3DCA4D4F9BC3}" type="datetimeFigureOut">
               <a:rPr lang="de-DE" smtClean="0"/>
               <a:pPr/>
-              <a:t>25.09.2012</a:t>
+              <a:t>16.10.2012</a:t>
             </a:fld>
             <a:endParaRPr lang="de-DE"/>
           </a:p>
@@ -802,7 +802,7 @@
             <a:fld id="{7CBDB685-D201-4371-8936-3DCA4D4F9BC3}" type="datetimeFigureOut">
               <a:rPr lang="de-DE" smtClean="0"/>
               <a:pPr/>
-              <a:t>25.09.2012</a:t>
+              <a:t>16.10.2012</a:t>
             </a:fld>
             <a:endParaRPr lang="de-DE"/>
           </a:p>
@@ -1045,7 +1045,7 @@
             <a:fld id="{7CBDB685-D201-4371-8936-3DCA4D4F9BC3}" type="datetimeFigureOut">
               <a:rPr lang="de-DE" smtClean="0"/>
               <a:pPr/>
-              <a:t>25.09.2012</a:t>
+              <a:t>16.10.2012</a:t>
             </a:fld>
             <a:endParaRPr lang="de-DE"/>
           </a:p>
@@ -1330,7 +1330,7 @@
             <a:fld id="{7CBDB685-D201-4371-8936-3DCA4D4F9BC3}" type="datetimeFigureOut">
               <a:rPr lang="de-DE" smtClean="0"/>
               <a:pPr/>
-              <a:t>25.09.2012</a:t>
+              <a:t>16.10.2012</a:t>
             </a:fld>
             <a:endParaRPr lang="de-DE"/>
           </a:p>
@@ -1749,7 +1749,7 @@
             <a:fld id="{7CBDB685-D201-4371-8936-3DCA4D4F9BC3}" type="datetimeFigureOut">
               <a:rPr lang="de-DE" smtClean="0"/>
               <a:pPr/>
-              <a:t>25.09.2012</a:t>
+              <a:t>16.10.2012</a:t>
             </a:fld>
             <a:endParaRPr lang="de-DE"/>
           </a:p>
@@ -1864,7 +1864,7 @@
             <a:fld id="{7CBDB685-D201-4371-8936-3DCA4D4F9BC3}" type="datetimeFigureOut">
               <a:rPr lang="de-DE" smtClean="0"/>
               <a:pPr/>
-              <a:t>25.09.2012</a:t>
+              <a:t>16.10.2012</a:t>
             </a:fld>
             <a:endParaRPr lang="de-DE"/>
           </a:p>
@@ -1956,7 +1956,7 @@
             <a:fld id="{7CBDB685-D201-4371-8936-3DCA4D4F9BC3}" type="datetimeFigureOut">
               <a:rPr lang="de-DE" smtClean="0"/>
               <a:pPr/>
-              <a:t>25.09.2012</a:t>
+              <a:t>16.10.2012</a:t>
             </a:fld>
             <a:endParaRPr lang="de-DE"/>
           </a:p>
@@ -2230,7 +2230,7 @@
             <a:fld id="{7CBDB685-D201-4371-8936-3DCA4D4F9BC3}" type="datetimeFigureOut">
               <a:rPr lang="de-DE" smtClean="0"/>
               <a:pPr/>
-              <a:t>25.09.2012</a:t>
+              <a:t>16.10.2012</a:t>
             </a:fld>
             <a:endParaRPr lang="de-DE"/>
           </a:p>
@@ -2480,7 +2480,7 @@
             <a:fld id="{7CBDB685-D201-4371-8936-3DCA4D4F9BC3}" type="datetimeFigureOut">
               <a:rPr lang="de-DE" smtClean="0"/>
               <a:pPr/>
-              <a:t>25.09.2012</a:t>
+              <a:t>16.10.2012</a:t>
             </a:fld>
             <a:endParaRPr lang="de-DE"/>
           </a:p>
@@ -2690,7 +2690,7 @@
             <a:fld id="{7CBDB685-D201-4371-8936-3DCA4D4F9BC3}" type="datetimeFigureOut">
               <a:rPr lang="de-DE" smtClean="0"/>
               <a:pPr/>
-              <a:t>25.09.2012</a:t>
+              <a:t>16.10.2012</a:t>
             </a:fld>
             <a:endParaRPr lang="de-DE"/>
           </a:p>
@@ -5384,6 +5384,698 @@
           </a:p>
         </p:txBody>
       </p:sp>
+      <p:cxnSp>
+        <p:nvCxnSpPr>
+          <p:cNvPr id="24" name="Gerade Verbindung 23"/>
+          <p:cNvCxnSpPr/>
+          <p:nvPr/>
+        </p:nvCxnSpPr>
+        <p:spPr>
+          <a:xfrm>
+            <a:off x="1018207" y="4293096"/>
+            <a:ext cx="576064" cy="0"/>
+          </a:xfrm>
+          <a:prstGeom prst="line">
+            <a:avLst/>
+          </a:prstGeom>
+          <a:ln w="57150">
+            <a:solidFill>
+              <a:schemeClr val="bg1"/>
+            </a:solidFill>
+          </a:ln>
+        </p:spPr>
+        <p:style>
+          <a:lnRef idx="1">
+            <a:schemeClr val="accent1"/>
+          </a:lnRef>
+          <a:fillRef idx="0">
+            <a:schemeClr val="accent1"/>
+          </a:fillRef>
+          <a:effectRef idx="0">
+            <a:schemeClr val="accent1"/>
+          </a:effectRef>
+          <a:fontRef idx="minor">
+            <a:schemeClr val="tx1"/>
+          </a:fontRef>
+        </p:style>
+      </p:cxnSp>
+      <p:sp>
+        <p:nvSpPr>
+          <p:cNvPr id="31" name="Textfeld 30"/>
+          <p:cNvSpPr txBox="1"/>
+          <p:nvPr/>
+        </p:nvSpPr>
+        <p:spPr>
+          <a:xfrm>
+            <a:off x="924993" y="4005064"/>
+            <a:ext cx="785793" cy="307777"/>
+          </a:xfrm>
+          <a:prstGeom prst="rect">
+            <a:avLst/>
+          </a:prstGeom>
+          <a:noFill/>
+        </p:spPr>
+        <p:txBody>
+          <a:bodyPr wrap="none" rtlCol="0">
+            <a:spAutoFit/>
+          </a:bodyPr>
+          <a:lstStyle/>
+          <a:p>
+            <a:r>
+              <a:rPr lang="de-DE" sz="1400" dirty="0" smtClean="0">
+                <a:solidFill>
+                  <a:schemeClr val="bg1"/>
+                </a:solidFill>
+                <a:latin typeface="Arial" pitchFamily="34" charset="0"/>
+                <a:cs typeface="Arial" pitchFamily="34" charset="0"/>
+              </a:rPr>
+              <a:t>100 </a:t>
+            </a:r>
+            <a:r>
+              <a:rPr lang="de-DE" sz="1400" dirty="0" smtClean="0">
+                <a:solidFill>
+                  <a:schemeClr val="bg1"/>
+                </a:solidFill>
+                <a:latin typeface="Arial" pitchFamily="34" charset="0"/>
+                <a:cs typeface="Arial" pitchFamily="34" charset="0"/>
+                <a:sym typeface="Symbol"/>
+              </a:rPr>
+              <a:t></a:t>
+            </a:r>
+            <a:r>
+              <a:rPr lang="de-DE" sz="1400" dirty="0" smtClean="0">
+                <a:solidFill>
+                  <a:schemeClr val="bg1"/>
+                </a:solidFill>
+                <a:latin typeface="Arial" pitchFamily="34" charset="0"/>
+                <a:cs typeface="Arial" pitchFamily="34" charset="0"/>
+              </a:rPr>
+              <a:t>m</a:t>
+            </a:r>
+            <a:endParaRPr lang="de-DE" sz="1400" dirty="0">
+              <a:solidFill>
+                <a:schemeClr val="bg1"/>
+              </a:solidFill>
+              <a:latin typeface="Arial" pitchFamily="34" charset="0"/>
+              <a:cs typeface="Arial" pitchFamily="34" charset="0"/>
+            </a:endParaRPr>
+          </a:p>
+        </p:txBody>
+      </p:sp>
+      <p:cxnSp>
+        <p:nvCxnSpPr>
+          <p:cNvPr id="37" name="Gerade Verbindung 36"/>
+          <p:cNvCxnSpPr/>
+          <p:nvPr/>
+        </p:nvCxnSpPr>
+        <p:spPr>
+          <a:xfrm>
+            <a:off x="1018207" y="2060848"/>
+            <a:ext cx="751776" cy="0"/>
+          </a:xfrm>
+          <a:prstGeom prst="line">
+            <a:avLst/>
+          </a:prstGeom>
+          <a:ln w="57150">
+            <a:solidFill>
+              <a:schemeClr val="bg1"/>
+            </a:solidFill>
+          </a:ln>
+        </p:spPr>
+        <p:style>
+          <a:lnRef idx="1">
+            <a:schemeClr val="accent1"/>
+          </a:lnRef>
+          <a:fillRef idx="0">
+            <a:schemeClr val="accent1"/>
+          </a:fillRef>
+          <a:effectRef idx="0">
+            <a:schemeClr val="accent1"/>
+          </a:effectRef>
+          <a:fontRef idx="minor">
+            <a:schemeClr val="tx1"/>
+          </a:fontRef>
+        </p:style>
+      </p:cxnSp>
+      <p:sp>
+        <p:nvSpPr>
+          <p:cNvPr id="38" name="Textfeld 37"/>
+          <p:cNvSpPr txBox="1"/>
+          <p:nvPr/>
+        </p:nvSpPr>
+        <p:spPr>
+          <a:xfrm>
+            <a:off x="924993" y="1772816"/>
+            <a:ext cx="631904" cy="307777"/>
+          </a:xfrm>
+          <a:prstGeom prst="rect">
+            <a:avLst/>
+          </a:prstGeom>
+          <a:noFill/>
+        </p:spPr>
+        <p:txBody>
+          <a:bodyPr wrap="none" rtlCol="0">
+            <a:spAutoFit/>
+          </a:bodyPr>
+          <a:lstStyle/>
+          <a:p>
+            <a:r>
+              <a:rPr lang="de-DE" sz="1400" dirty="0" smtClean="0">
+                <a:solidFill>
+                  <a:schemeClr val="bg1"/>
+                </a:solidFill>
+                <a:latin typeface="Arial" pitchFamily="34" charset="0"/>
+                <a:cs typeface="Arial" pitchFamily="34" charset="0"/>
+              </a:rPr>
+              <a:t>1 </a:t>
+            </a:r>
+            <a:r>
+              <a:rPr lang="de-DE" sz="1400" dirty="0" smtClean="0">
+                <a:solidFill>
+                  <a:schemeClr val="bg1"/>
+                </a:solidFill>
+                <a:latin typeface="Arial" pitchFamily="34" charset="0"/>
+                <a:cs typeface="Arial" pitchFamily="34" charset="0"/>
+                <a:sym typeface="Symbol"/>
+              </a:rPr>
+              <a:t>m</a:t>
+            </a:r>
+            <a:r>
+              <a:rPr lang="de-DE" sz="1400" dirty="0" smtClean="0">
+                <a:solidFill>
+                  <a:schemeClr val="bg1"/>
+                </a:solidFill>
+                <a:latin typeface="Arial" pitchFamily="34" charset="0"/>
+                <a:cs typeface="Arial" pitchFamily="34" charset="0"/>
+              </a:rPr>
+              <a:t>m</a:t>
+            </a:r>
+            <a:endParaRPr lang="de-DE" sz="1400" dirty="0">
+              <a:solidFill>
+                <a:schemeClr val="bg1"/>
+              </a:solidFill>
+              <a:latin typeface="Arial" pitchFamily="34" charset="0"/>
+              <a:cs typeface="Arial" pitchFamily="34" charset="0"/>
+            </a:endParaRPr>
+          </a:p>
+        </p:txBody>
+      </p:sp>
+      <p:cxnSp>
+        <p:nvCxnSpPr>
+          <p:cNvPr id="41" name="Gerade Verbindung 40"/>
+          <p:cNvCxnSpPr/>
+          <p:nvPr/>
+        </p:nvCxnSpPr>
+        <p:spPr>
+          <a:xfrm>
+            <a:off x="7380312" y="3429000"/>
+            <a:ext cx="648072" cy="0"/>
+          </a:xfrm>
+          <a:prstGeom prst="line">
+            <a:avLst/>
+          </a:prstGeom>
+          <a:ln w="57150">
+            <a:solidFill>
+              <a:schemeClr val="bg1"/>
+            </a:solidFill>
+          </a:ln>
+        </p:spPr>
+        <p:style>
+          <a:lnRef idx="1">
+            <a:schemeClr val="accent1"/>
+          </a:lnRef>
+          <a:fillRef idx="0">
+            <a:schemeClr val="accent1"/>
+          </a:fillRef>
+          <a:effectRef idx="0">
+            <a:schemeClr val="accent1"/>
+          </a:effectRef>
+          <a:fontRef idx="minor">
+            <a:schemeClr val="tx1"/>
+          </a:fontRef>
+        </p:style>
+      </p:cxnSp>
+      <p:sp>
+        <p:nvSpPr>
+          <p:cNvPr id="42" name="Textfeld 41"/>
+          <p:cNvSpPr txBox="1"/>
+          <p:nvPr/>
+        </p:nvSpPr>
+        <p:spPr>
+          <a:xfrm>
+            <a:off x="7308304" y="3140968"/>
+            <a:ext cx="686406" cy="307777"/>
+          </a:xfrm>
+          <a:prstGeom prst="rect">
+            <a:avLst/>
+          </a:prstGeom>
+          <a:noFill/>
+        </p:spPr>
+        <p:txBody>
+          <a:bodyPr wrap="none" rtlCol="0">
+            <a:spAutoFit/>
+          </a:bodyPr>
+          <a:lstStyle/>
+          <a:p>
+            <a:r>
+              <a:rPr lang="de-DE" sz="1400" dirty="0" smtClean="0">
+                <a:solidFill>
+                  <a:schemeClr val="bg1"/>
+                </a:solidFill>
+                <a:latin typeface="Arial" pitchFamily="34" charset="0"/>
+                <a:cs typeface="Arial" pitchFamily="34" charset="0"/>
+              </a:rPr>
+              <a:t>5</a:t>
+            </a:r>
+            <a:r>
+              <a:rPr lang="de-DE" sz="1400" dirty="0" smtClean="0">
+                <a:solidFill>
+                  <a:schemeClr val="bg1"/>
+                </a:solidFill>
+                <a:latin typeface="Arial" pitchFamily="34" charset="0"/>
+                <a:cs typeface="Arial" pitchFamily="34" charset="0"/>
+              </a:rPr>
+              <a:t>0 </a:t>
+            </a:r>
+            <a:r>
+              <a:rPr lang="de-DE" sz="1400" dirty="0" smtClean="0">
+                <a:solidFill>
+                  <a:schemeClr val="bg1"/>
+                </a:solidFill>
+                <a:latin typeface="Arial" pitchFamily="34" charset="0"/>
+                <a:cs typeface="Arial" pitchFamily="34" charset="0"/>
+                <a:sym typeface="Symbol"/>
+              </a:rPr>
+              <a:t></a:t>
+            </a:r>
+            <a:r>
+              <a:rPr lang="de-DE" sz="1400" dirty="0" smtClean="0">
+                <a:solidFill>
+                  <a:schemeClr val="bg1"/>
+                </a:solidFill>
+                <a:latin typeface="Arial" pitchFamily="34" charset="0"/>
+                <a:cs typeface="Arial" pitchFamily="34" charset="0"/>
+              </a:rPr>
+              <a:t>m</a:t>
+            </a:r>
+            <a:endParaRPr lang="de-DE" sz="1400" dirty="0">
+              <a:solidFill>
+                <a:schemeClr val="bg1"/>
+              </a:solidFill>
+              <a:latin typeface="Arial" pitchFamily="34" charset="0"/>
+              <a:cs typeface="Arial" pitchFamily="34" charset="0"/>
+            </a:endParaRPr>
+          </a:p>
+        </p:txBody>
+      </p:sp>
+      <p:cxnSp>
+        <p:nvCxnSpPr>
+          <p:cNvPr id="44" name="Gerade Verbindung 43"/>
+          <p:cNvCxnSpPr/>
+          <p:nvPr/>
+        </p:nvCxnSpPr>
+        <p:spPr>
+          <a:xfrm>
+            <a:off x="920798" y="6461803"/>
+            <a:ext cx="432048" cy="0"/>
+          </a:xfrm>
+          <a:prstGeom prst="line">
+            <a:avLst/>
+          </a:prstGeom>
+          <a:ln w="57150">
+            <a:solidFill>
+              <a:schemeClr val="tx1"/>
+            </a:solidFill>
+          </a:ln>
+        </p:spPr>
+        <p:style>
+          <a:lnRef idx="1">
+            <a:schemeClr val="accent1"/>
+          </a:lnRef>
+          <a:fillRef idx="0">
+            <a:schemeClr val="accent1"/>
+          </a:fillRef>
+          <a:effectRef idx="0">
+            <a:schemeClr val="accent1"/>
+          </a:effectRef>
+          <a:fontRef idx="minor">
+            <a:schemeClr val="tx1"/>
+          </a:fontRef>
+        </p:style>
+      </p:cxnSp>
+      <p:sp>
+        <p:nvSpPr>
+          <p:cNvPr id="45" name="Textfeld 44"/>
+          <p:cNvSpPr txBox="1"/>
+          <p:nvPr/>
+        </p:nvSpPr>
+        <p:spPr>
+          <a:xfrm>
+            <a:off x="810650" y="6179427"/>
+            <a:ext cx="686406" cy="307777"/>
+          </a:xfrm>
+          <a:prstGeom prst="rect">
+            <a:avLst/>
+          </a:prstGeom>
+          <a:noFill/>
+        </p:spPr>
+        <p:txBody>
+          <a:bodyPr wrap="none" rtlCol="0">
+            <a:spAutoFit/>
+          </a:bodyPr>
+          <a:lstStyle/>
+          <a:p>
+            <a:r>
+              <a:rPr lang="de-DE" sz="1400" dirty="0" smtClean="0">
+                <a:latin typeface="Arial" pitchFamily="34" charset="0"/>
+                <a:cs typeface="Arial" pitchFamily="34" charset="0"/>
+              </a:rPr>
+              <a:t>20 </a:t>
+            </a:r>
+            <a:r>
+              <a:rPr lang="de-DE" sz="1400" dirty="0" smtClean="0">
+                <a:latin typeface="Arial" pitchFamily="34" charset="0"/>
+                <a:cs typeface="Arial" pitchFamily="34" charset="0"/>
+                <a:sym typeface="Symbol"/>
+              </a:rPr>
+              <a:t></a:t>
+            </a:r>
+            <a:r>
+              <a:rPr lang="de-DE" sz="1400" dirty="0" smtClean="0">
+                <a:latin typeface="Arial" pitchFamily="34" charset="0"/>
+                <a:cs typeface="Arial" pitchFamily="34" charset="0"/>
+              </a:rPr>
+              <a:t>m</a:t>
+            </a:r>
+            <a:endParaRPr lang="de-DE" sz="1400" dirty="0">
+              <a:latin typeface="Arial" pitchFamily="34" charset="0"/>
+              <a:cs typeface="Arial" pitchFamily="34" charset="0"/>
+            </a:endParaRPr>
+          </a:p>
+        </p:txBody>
+      </p:sp>
+      <p:cxnSp>
+        <p:nvCxnSpPr>
+          <p:cNvPr id="49" name="Gerade Verbindung 48"/>
+          <p:cNvCxnSpPr/>
+          <p:nvPr/>
+        </p:nvCxnSpPr>
+        <p:spPr>
+          <a:xfrm>
+            <a:off x="2400804" y="6461803"/>
+            <a:ext cx="432048" cy="0"/>
+          </a:xfrm>
+          <a:prstGeom prst="line">
+            <a:avLst/>
+          </a:prstGeom>
+          <a:ln w="57150">
+            <a:solidFill>
+              <a:schemeClr val="bg1"/>
+            </a:solidFill>
+          </a:ln>
+        </p:spPr>
+        <p:style>
+          <a:lnRef idx="1">
+            <a:schemeClr val="accent1"/>
+          </a:lnRef>
+          <a:fillRef idx="0">
+            <a:schemeClr val="accent1"/>
+          </a:fillRef>
+          <a:effectRef idx="0">
+            <a:schemeClr val="accent1"/>
+          </a:effectRef>
+          <a:fontRef idx="minor">
+            <a:schemeClr val="tx1"/>
+          </a:fontRef>
+        </p:style>
+      </p:cxnSp>
+      <p:sp>
+        <p:nvSpPr>
+          <p:cNvPr id="50" name="Textfeld 49"/>
+          <p:cNvSpPr txBox="1"/>
+          <p:nvPr/>
+        </p:nvSpPr>
+        <p:spPr>
+          <a:xfrm>
+            <a:off x="2328796" y="6179427"/>
+            <a:ext cx="587020" cy="307777"/>
+          </a:xfrm>
+          <a:prstGeom prst="rect">
+            <a:avLst/>
+          </a:prstGeom>
+          <a:noFill/>
+        </p:spPr>
+        <p:txBody>
+          <a:bodyPr wrap="none" rtlCol="0">
+            <a:spAutoFit/>
+          </a:bodyPr>
+          <a:lstStyle/>
+          <a:p>
+            <a:r>
+              <a:rPr lang="de-DE" sz="1400" dirty="0" smtClean="0">
+                <a:solidFill>
+                  <a:schemeClr val="bg1"/>
+                </a:solidFill>
+                <a:latin typeface="Arial" pitchFamily="34" charset="0"/>
+                <a:cs typeface="Arial" pitchFamily="34" charset="0"/>
+              </a:rPr>
+              <a:t>2</a:t>
+            </a:r>
+            <a:r>
+              <a:rPr lang="de-DE" sz="1400" dirty="0" smtClean="0">
+                <a:solidFill>
+                  <a:schemeClr val="bg1"/>
+                </a:solidFill>
+                <a:latin typeface="Arial" pitchFamily="34" charset="0"/>
+                <a:cs typeface="Arial" pitchFamily="34" charset="0"/>
+              </a:rPr>
+              <a:t> </a:t>
+            </a:r>
+            <a:r>
+              <a:rPr lang="de-DE" sz="1400" dirty="0" smtClean="0">
+                <a:solidFill>
+                  <a:schemeClr val="bg1"/>
+                </a:solidFill>
+                <a:latin typeface="Arial" pitchFamily="34" charset="0"/>
+                <a:cs typeface="Arial" pitchFamily="34" charset="0"/>
+                <a:sym typeface="Symbol"/>
+              </a:rPr>
+              <a:t></a:t>
+            </a:r>
+            <a:r>
+              <a:rPr lang="de-DE" sz="1400" dirty="0" smtClean="0">
+                <a:solidFill>
+                  <a:schemeClr val="bg1"/>
+                </a:solidFill>
+                <a:latin typeface="Arial" pitchFamily="34" charset="0"/>
+                <a:cs typeface="Arial" pitchFamily="34" charset="0"/>
+              </a:rPr>
+              <a:t>m</a:t>
+            </a:r>
+            <a:endParaRPr lang="de-DE" sz="1400" dirty="0">
+              <a:solidFill>
+                <a:schemeClr val="bg1"/>
+              </a:solidFill>
+              <a:latin typeface="Arial" pitchFamily="34" charset="0"/>
+              <a:cs typeface="Arial" pitchFamily="34" charset="0"/>
+            </a:endParaRPr>
+          </a:p>
+        </p:txBody>
+      </p:sp>
+      <p:cxnSp>
+        <p:nvCxnSpPr>
+          <p:cNvPr id="52" name="Gerade Verbindung 51"/>
+          <p:cNvCxnSpPr/>
+          <p:nvPr/>
+        </p:nvCxnSpPr>
+        <p:spPr>
+          <a:xfrm>
+            <a:off x="4355976" y="6461803"/>
+            <a:ext cx="432048" cy="0"/>
+          </a:xfrm>
+          <a:prstGeom prst="line">
+            <a:avLst/>
+          </a:prstGeom>
+          <a:ln w="57150">
+            <a:solidFill>
+              <a:schemeClr val="bg1"/>
+            </a:solidFill>
+          </a:ln>
+        </p:spPr>
+        <p:style>
+          <a:lnRef idx="1">
+            <a:schemeClr val="accent1"/>
+          </a:lnRef>
+          <a:fillRef idx="0">
+            <a:schemeClr val="accent1"/>
+          </a:fillRef>
+          <a:effectRef idx="0">
+            <a:schemeClr val="accent1"/>
+          </a:effectRef>
+          <a:fontRef idx="minor">
+            <a:schemeClr val="tx1"/>
+          </a:fontRef>
+        </p:style>
+      </p:cxnSp>
+      <p:sp>
+        <p:nvSpPr>
+          <p:cNvPr id="53" name="Textfeld 52"/>
+          <p:cNvSpPr txBox="1"/>
+          <p:nvPr/>
+        </p:nvSpPr>
+        <p:spPr>
+          <a:xfrm>
+            <a:off x="4283968" y="6179427"/>
+            <a:ext cx="587020" cy="307777"/>
+          </a:xfrm>
+          <a:prstGeom prst="rect">
+            <a:avLst/>
+          </a:prstGeom>
+          <a:noFill/>
+        </p:spPr>
+        <p:txBody>
+          <a:bodyPr wrap="none" rtlCol="0">
+            <a:spAutoFit/>
+          </a:bodyPr>
+          <a:lstStyle/>
+          <a:p>
+            <a:r>
+              <a:rPr lang="de-DE" sz="1400" dirty="0" smtClean="0">
+                <a:solidFill>
+                  <a:schemeClr val="bg1"/>
+                </a:solidFill>
+                <a:latin typeface="Arial" pitchFamily="34" charset="0"/>
+                <a:cs typeface="Arial" pitchFamily="34" charset="0"/>
+              </a:rPr>
+              <a:t>2</a:t>
+            </a:r>
+            <a:r>
+              <a:rPr lang="de-DE" sz="1400" dirty="0" smtClean="0">
+                <a:solidFill>
+                  <a:schemeClr val="bg1"/>
+                </a:solidFill>
+                <a:latin typeface="Arial" pitchFamily="34" charset="0"/>
+                <a:cs typeface="Arial" pitchFamily="34" charset="0"/>
+              </a:rPr>
+              <a:t> </a:t>
+            </a:r>
+            <a:r>
+              <a:rPr lang="de-DE" sz="1400" dirty="0" smtClean="0">
+                <a:solidFill>
+                  <a:schemeClr val="bg1"/>
+                </a:solidFill>
+                <a:latin typeface="Arial" pitchFamily="34" charset="0"/>
+                <a:cs typeface="Arial" pitchFamily="34" charset="0"/>
+                <a:sym typeface="Symbol"/>
+              </a:rPr>
+              <a:t></a:t>
+            </a:r>
+            <a:r>
+              <a:rPr lang="de-DE" sz="1400" dirty="0" smtClean="0">
+                <a:solidFill>
+                  <a:schemeClr val="bg1"/>
+                </a:solidFill>
+                <a:latin typeface="Arial" pitchFamily="34" charset="0"/>
+                <a:cs typeface="Arial" pitchFamily="34" charset="0"/>
+              </a:rPr>
+              <a:t>m</a:t>
+            </a:r>
+            <a:endParaRPr lang="de-DE" sz="1400" dirty="0">
+              <a:solidFill>
+                <a:schemeClr val="bg1"/>
+              </a:solidFill>
+              <a:latin typeface="Arial" pitchFamily="34" charset="0"/>
+              <a:cs typeface="Arial" pitchFamily="34" charset="0"/>
+            </a:endParaRPr>
+          </a:p>
+        </p:txBody>
+      </p:sp>
+      <p:cxnSp>
+        <p:nvCxnSpPr>
+          <p:cNvPr id="54" name="Gerade Verbindung 53"/>
+          <p:cNvCxnSpPr/>
+          <p:nvPr/>
+        </p:nvCxnSpPr>
+        <p:spPr>
+          <a:xfrm>
+            <a:off x="6283258" y="6461803"/>
+            <a:ext cx="288032" cy="0"/>
+          </a:xfrm>
+          <a:prstGeom prst="line">
+            <a:avLst/>
+          </a:prstGeom>
+          <a:ln w="57150">
+            <a:solidFill>
+              <a:schemeClr val="tx1"/>
+            </a:solidFill>
+          </a:ln>
+        </p:spPr>
+        <p:style>
+          <a:lnRef idx="1">
+            <a:schemeClr val="accent1"/>
+          </a:lnRef>
+          <a:fillRef idx="0">
+            <a:schemeClr val="accent1"/>
+          </a:fillRef>
+          <a:effectRef idx="0">
+            <a:schemeClr val="accent1"/>
+          </a:effectRef>
+          <a:fontRef idx="minor">
+            <a:schemeClr val="tx1"/>
+          </a:fontRef>
+        </p:style>
+      </p:cxnSp>
+      <p:sp>
+        <p:nvSpPr>
+          <p:cNvPr id="55" name="Textfeld 54"/>
+          <p:cNvSpPr txBox="1"/>
+          <p:nvPr/>
+        </p:nvSpPr>
+        <p:spPr>
+          <a:xfrm>
+            <a:off x="6190044" y="6179427"/>
+            <a:ext cx="686406" cy="307777"/>
+          </a:xfrm>
+          <a:prstGeom prst="rect">
+            <a:avLst/>
+          </a:prstGeom>
+          <a:noFill/>
+        </p:spPr>
+        <p:txBody>
+          <a:bodyPr wrap="none" rtlCol="0">
+            <a:spAutoFit/>
+          </a:bodyPr>
+          <a:lstStyle/>
+          <a:p>
+            <a:r>
+              <a:rPr lang="de-DE" sz="1400" dirty="0" smtClean="0">
+                <a:latin typeface="Arial" pitchFamily="34" charset="0"/>
+                <a:cs typeface="Arial" pitchFamily="34" charset="0"/>
+              </a:rPr>
+              <a:t>20 </a:t>
+            </a:r>
+            <a:r>
+              <a:rPr lang="de-DE" sz="1400" dirty="0" smtClean="0">
+                <a:latin typeface="Arial" pitchFamily="34" charset="0"/>
+                <a:cs typeface="Arial" pitchFamily="34" charset="0"/>
+                <a:sym typeface="Symbol"/>
+              </a:rPr>
+              <a:t></a:t>
+            </a:r>
+            <a:r>
+              <a:rPr lang="de-DE" sz="1400" dirty="0" smtClean="0">
+                <a:latin typeface="Arial" pitchFamily="34" charset="0"/>
+                <a:cs typeface="Arial" pitchFamily="34" charset="0"/>
+              </a:rPr>
+              <a:t>m</a:t>
+            </a:r>
+            <a:endParaRPr lang="de-DE" sz="1400" dirty="0">
+              <a:latin typeface="Arial" pitchFamily="34" charset="0"/>
+              <a:cs typeface="Arial" pitchFamily="34" charset="0"/>
+            </a:endParaRPr>
+          </a:p>
+        </p:txBody>
+      </p:sp>
     </p:spTree>
   </p:cSld>
   <p:clrMapOvr>

</xml_diff>